<commit_message>
Workflow development - work in progress added - login to jira, sharepoint, data extract and filter, add data to powerpoint
</commit_message>
<xml_diff>
--- a/Data/Input/Robotic Process Automation PMO.pptx
+++ b/Data/Input/Robotic Process Automation PMO.pptx
@@ -4668,6 +4668,155 @@
           </a:prstGeom>
         </p:spPr>
       </p:pic>
+      <p:graphicFrame>
+        <p:nvGraphicFramePr>
+          <p:cNvPr id="3" name="Table 2">
+            <a:extLst>
+              <a:ext uri="{FF2B5EF4-FFF2-40B4-BE49-F238E27FC236}">
+                <a16:creationId xmlns:a16="http://schemas.microsoft.com/office/drawing/2014/main" id="{FB3E1B07-34A0-4ACF-AC1C-45B25E4D6CE9}"/>
+              </a:ext>
+            </a:extLst>
+          </p:cNvPr>
+          <p:cNvGraphicFramePr>
+            <a:graphicFrameLocks noGrp="1"/>
+          </p:cNvGraphicFramePr>
+          <p:nvPr>
+            <p:extLst>
+              <p:ext uri="{D42A27DB-BD31-4B8C-83A1-F6EECF244321}">
+                <p14:modId xmlns:p14="http://schemas.microsoft.com/office/powerpoint/2010/main" val="777599055"/>
+              </p:ext>
+            </p:extLst>
+          </p:nvPr>
+        </p:nvGraphicFramePr>
+        <p:xfrm>
+          <a:off x="2032000" y="719666"/>
+          <a:ext cx="8128000" cy="5418667"/>
+        </p:xfrm>
+        <a:graphic>
+          <a:graphicData uri="http://schemas.openxmlformats.org/drawingml/2006/table">
+            <a:tbl>
+              <a:tblPr firstRow="1" bandRow="1">
+                <a:tableStyleId>{5C22544A-7EE6-4342-B048-85BDC9FD1C3A}</a:tableStyleId>
+              </a:tblPr>
+              <a:tblGrid>
+                <a:gridCol w="4064000">
+                  <a:extLst>
+                    <a:ext uri="{9D8B030D-6E8A-4147-A177-3AD203B41FA5}">
+                      <a16:colId xmlns:a16="http://schemas.microsoft.com/office/drawing/2014/main" val="3075661065"/>
+                    </a:ext>
+                  </a:extLst>
+                </a:gridCol>
+                <a:gridCol w="4064000">
+                  <a:extLst>
+                    <a:ext uri="{9D8B030D-6E8A-4147-A177-3AD203B41FA5}">
+                      <a16:colId xmlns:a16="http://schemas.microsoft.com/office/drawing/2014/main" val="2992441762"/>
+                    </a:ext>
+                  </a:extLst>
+                </a:gridCol>
+              </a:tblGrid>
+              <a:tr h="370840">
+                <a:tc>
+                  <a:txBody>
+                    <a:bodyPr/>
+                    <a:lstStyle/>
+                    <a:p>
+                      <a:r>
+                        <a:rPr lang="en-US"/>
+                        <a:t>Summary</a:t>
+                      </a:r>
+                    </a:p>
+                  </a:txBody>
+                  <a:tcPr/>
+                </a:tc>
+                <a:tc>
+                  <a:txBody>
+                    <a:bodyPr/>
+                    <a:lstStyle/>
+                    <a:p>
+                      <a:r>
+                        <a:rPr lang="en-US"/>
+                        <a:t>Assignee</a:t>
+                      </a:r>
+                    </a:p>
+                  </a:txBody>
+                  <a:tcPr/>
+                </a:tc>
+                <a:extLst>
+                  <a:ext uri="{0D108BD9-81ED-4DB2-BD59-A6C34878D82A}">
+                    <a16:rowId xmlns:a16="http://schemas.microsoft.com/office/drawing/2014/main" val="3292732180"/>
+                  </a:ext>
+                </a:extLst>
+              </a:tr>
+              <a:tr h="370840">
+                <a:tc>
+                  <a:txBody>
+                    <a:bodyPr/>
+                    <a:lstStyle/>
+                    <a:p>
+                      <a:r>
+                        <a:rPr lang="en-US"/>
+                        <a:t>Develop Test Case Scenarios</a:t>
+                      </a:r>
+                    </a:p>
+                  </a:txBody>
+                  <a:tcPr/>
+                </a:tc>
+                <a:tc>
+                  <a:txBody>
+                    <a:bodyPr/>
+                    <a:lstStyle/>
+                    <a:p>
+                      <a:r>
+                        <a:rPr lang="en-US"/>
+                        <a:t>elevatebot</a:t>
+                      </a:r>
+                    </a:p>
+                  </a:txBody>
+                  <a:tcPr/>
+                </a:tc>
+                <a:extLst>
+                  <a:ext uri="{0D108BD9-81ED-4DB2-BD59-A6C34878D82A}">
+                    <a16:rowId xmlns:a16="http://schemas.microsoft.com/office/drawing/2014/main" val="3933621223"/>
+                  </a:ext>
+                </a:extLst>
+              </a:tr>
+              <a:tr h="370840">
+                <a:tc>
+                  <a:txBody>
+                    <a:bodyPr/>
+                    <a:lstStyle/>
+                    <a:p>
+                      <a:r>
+                        <a:rPr lang="en-US"/>
+                        <a:t>Create Product Roadmap</a:t>
+                      </a:r>
+                    </a:p>
+                  </a:txBody>
+                  <a:tcPr/>
+                </a:tc>
+                <a:tc>
+                  <a:txBody>
+                    <a:bodyPr/>
+                    <a:lstStyle/>
+                    <a:p>
+                      <a:r>
+                        <a:rPr lang="en-US"/>
+                        <a:t>elevatebot</a:t>
+                      </a:r>
+                    </a:p>
+                  </a:txBody>
+                  <a:tcPr/>
+                </a:tc>
+                <a:extLst>
+                  <a:ext uri="{0D108BD9-81ED-4DB2-BD59-A6C34878D82A}">
+                    <a16:rowId xmlns:a16="http://schemas.microsoft.com/office/drawing/2014/main" val="199399901"/>
+                  </a:ext>
+                </a:extLst>
+              </a:tr>
+            </a:tbl>
+          </a:graphicData>
+        </a:graphic>
+      </p:graphicFrame>
     </p:spTree>
     <p:extLst>
       <p:ext uri="{BB962C8B-B14F-4D97-AF65-F5344CB8AC3E}">
@@ -5263,7 +5412,7 @@
       </p:sp>
       <p:graphicFrame>
         <p:nvGraphicFramePr>
-          <p:cNvPr id="12" name="Table 10">
+          <p:cNvPr id="12" name="10">
             <a:extLst>
               <a:ext uri="{FF2B5EF4-FFF2-40B4-BE49-F238E27FC236}">
                 <a16:creationId xmlns:a16="http://schemas.microsoft.com/office/drawing/2014/main" id="{895332B6-5C45-4DC9-B482-92D0E52B4CF2}"/>
@@ -5276,7 +5425,7 @@
           <p:nvPr>
             <p:extLst>
               <p:ext uri="{D42A27DB-BD31-4B8C-83A1-F6EECF244321}">
-                <p14:modId xmlns:p14="http://schemas.microsoft.com/office/powerpoint/2010/main" val="3791741894"/>
+                <p14:modId xmlns:p14="http://schemas.microsoft.com/office/powerpoint/2010/main" val="773025837"/>
               </p:ext>
             </p:extLst>
           </p:nvPr>
@@ -5495,6 +5644,591 @@
                 <a:extLst>
                   <a:ext uri="{0D108BD9-81ED-4DB2-BD59-A6C34878D82A}">
                     <a16:rowId xmlns:a16="http://schemas.microsoft.com/office/drawing/2014/main" val="381752107"/>
+                  </a:ext>
+                </a:extLst>
+              </a:tr>
+            </a:tbl>
+          </a:graphicData>
+        </a:graphic>
+      </p:graphicFrame>
+      <p:graphicFrame>
+        <p:nvGraphicFramePr>
+          <p:cNvPr id="2" name="Table 1">
+            <a:extLst>
+              <a:ext uri="{FF2B5EF4-FFF2-40B4-BE49-F238E27FC236}">
+                <a16:creationId xmlns:a16="http://schemas.microsoft.com/office/drawing/2014/main" id="{23A64537-1A60-4A73-8B65-467596E177A0}"/>
+              </a:ext>
+            </a:extLst>
+          </p:cNvPr>
+          <p:cNvGraphicFramePr>
+            <a:graphicFrameLocks noGrp="1"/>
+          </p:cNvGraphicFramePr>
+          <p:nvPr>
+            <p:extLst>
+              <p:ext uri="{D42A27DB-BD31-4B8C-83A1-F6EECF244321}">
+                <p14:modId xmlns:p14="http://schemas.microsoft.com/office/powerpoint/2010/main" val="746634734"/>
+              </p:ext>
+            </p:extLst>
+          </p:nvPr>
+        </p:nvGraphicFramePr>
+        <p:xfrm>
+          <a:off x="2032000" y="719666"/>
+          <a:ext cx="8128000" cy="5418667"/>
+        </p:xfrm>
+        <a:graphic>
+          <a:graphicData uri="http://schemas.openxmlformats.org/drawingml/2006/table">
+            <a:tbl>
+              <a:tblPr firstRow="1" bandRow="1">
+                <a:tableStyleId>{5C22544A-7EE6-4342-B048-85BDC9FD1C3A}</a:tableStyleId>
+              </a:tblPr>
+              <a:tblGrid>
+                <a:gridCol w="2709333">
+                  <a:extLst>
+                    <a:ext uri="{9D8B030D-6E8A-4147-A177-3AD203B41FA5}">
+                      <a16:colId xmlns:a16="http://schemas.microsoft.com/office/drawing/2014/main" val="2186254044"/>
+                    </a:ext>
+                  </a:extLst>
+                </a:gridCol>
+                <a:gridCol w="2709333">
+                  <a:extLst>
+                    <a:ext uri="{9D8B030D-6E8A-4147-A177-3AD203B41FA5}">
+                      <a16:colId xmlns:a16="http://schemas.microsoft.com/office/drawing/2014/main" val="2852005123"/>
+                    </a:ext>
+                  </a:extLst>
+                </a:gridCol>
+                <a:gridCol w="2709333">
+                  <a:extLst>
+                    <a:ext uri="{9D8B030D-6E8A-4147-A177-3AD203B41FA5}">
+                      <a16:colId xmlns:a16="http://schemas.microsoft.com/office/drawing/2014/main" val="2076152527"/>
+                    </a:ext>
+                  </a:extLst>
+                </a:gridCol>
+              </a:tblGrid>
+              <a:tr h="370840">
+                <a:tc>
+                  <a:txBody>
+                    <a:bodyPr/>
+                    <a:lstStyle/>
+                    <a:p>
+                      <a:r>
+                        <a:rPr lang="en-US"/>
+                        <a:t>Risk Description</a:t>
+                      </a:r>
+                    </a:p>
+                  </a:txBody>
+                  <a:tcPr/>
+                </a:tc>
+                <a:tc>
+                  <a:txBody>
+                    <a:bodyPr/>
+                    <a:lstStyle/>
+                    <a:p>
+                      <a:r>
+                        <a:rPr lang="en-US"/>
+                        <a:t>Severity</a:t>
+                      </a:r>
+                    </a:p>
+                  </a:txBody>
+                  <a:tcPr/>
+                </a:tc>
+                <a:tc>
+                  <a:txBody>
+                    <a:bodyPr/>
+                    <a:lstStyle/>
+                    <a:p>
+                      <a:r>
+                        <a:rPr lang="en-US"/>
+                        <a:t>Owner</a:t>
+                      </a:r>
+                    </a:p>
+                  </a:txBody>
+                  <a:tcPr/>
+                </a:tc>
+                <a:extLst>
+                  <a:ext uri="{0D108BD9-81ED-4DB2-BD59-A6C34878D82A}">
+                    <a16:rowId xmlns:a16="http://schemas.microsoft.com/office/drawing/2014/main" val="3808015986"/>
+                  </a:ext>
+                </a:extLst>
+              </a:tr>
+              <a:tr h="370840">
+                <a:tc>
+                  <a:txBody>
+                    <a:bodyPr/>
+                    <a:lstStyle/>
+                    <a:p>
+                      <a:r>
+                        <a:rPr lang="en-US"/>
+                        <a:t>If something happens, then something bad will happen to the program</a:t>
+                      </a:r>
+                    </a:p>
+                  </a:txBody>
+                  <a:tcPr/>
+                </a:tc>
+                <a:tc>
+                  <a:txBody>
+                    <a:bodyPr/>
+                    <a:lstStyle/>
+                    <a:p>
+                      <a:r>
+                        <a:rPr lang="en-US"/>
+                        <a:t>High</a:t>
+                      </a:r>
+                    </a:p>
+                  </a:txBody>
+                  <a:tcPr/>
+                </a:tc>
+                <a:tc>
+                  <a:txBody>
+                    <a:bodyPr/>
+                    <a:lstStyle/>
+                    <a:p>
+                      <a:r>
+                        <a:rPr lang="en-US"/>
+                        <a:t>Elevate Bot</a:t>
+                      </a:r>
+                    </a:p>
+                  </a:txBody>
+                  <a:tcPr/>
+                </a:tc>
+                <a:extLst>
+                  <a:ext uri="{0D108BD9-81ED-4DB2-BD59-A6C34878D82A}">
+                    <a16:rowId xmlns:a16="http://schemas.microsoft.com/office/drawing/2014/main" val="3625312855"/>
+                  </a:ext>
+                </a:extLst>
+              </a:tr>
+              <a:tr h="370840">
+                <a:tc>
+                  <a:txBody>
+                    <a:bodyPr/>
+                    <a:lstStyle/>
+                    <a:p>
+                      <a:r>
+                        <a:rPr lang="en-US"/>
+                        <a:t>If the bot gets a mind of its own, then we will need to kill it</a:t>
+                      </a:r>
+                    </a:p>
+                  </a:txBody>
+                  <a:tcPr/>
+                </a:tc>
+                <a:tc>
+                  <a:txBody>
+                    <a:bodyPr/>
+                    <a:lstStyle/>
+                    <a:p>
+                      <a:r>
+                        <a:rPr lang="en-US"/>
+                        <a:t>Medium</a:t>
+                      </a:r>
+                    </a:p>
+                  </a:txBody>
+                  <a:tcPr/>
+                </a:tc>
+                <a:tc>
+                  <a:txBody>
+                    <a:bodyPr/>
+                    <a:lstStyle/>
+                    <a:p>
+                      <a:r>
+                        <a:rPr lang="en-US"/>
+                        <a:t>Elevate Bot</a:t>
+                      </a:r>
+                    </a:p>
+                  </a:txBody>
+                  <a:tcPr/>
+                </a:tc>
+                <a:extLst>
+                  <a:ext uri="{0D108BD9-81ED-4DB2-BD59-A6C34878D82A}">
+                    <a16:rowId xmlns:a16="http://schemas.microsoft.com/office/drawing/2014/main" val="2995708850"/>
+                  </a:ext>
+                </a:extLst>
+              </a:tr>
+            </a:tbl>
+          </a:graphicData>
+        </a:graphic>
+      </p:graphicFrame>
+      <p:graphicFrame>
+        <p:nvGraphicFramePr>
+          <p:cNvPr id="3" name="Table 2">
+            <a:extLst>
+              <a:ext uri="{FF2B5EF4-FFF2-40B4-BE49-F238E27FC236}">
+                <a16:creationId xmlns:a16="http://schemas.microsoft.com/office/drawing/2014/main" id="{390421B4-BDA9-4B38-B6FB-004BDA42838A}"/>
+              </a:ext>
+            </a:extLst>
+          </p:cNvPr>
+          <p:cNvGraphicFramePr>
+            <a:graphicFrameLocks noGrp="1"/>
+          </p:cNvGraphicFramePr>
+          <p:nvPr>
+            <p:extLst>
+              <p:ext uri="{D42A27DB-BD31-4B8C-83A1-F6EECF244321}">
+                <p14:modId xmlns:p14="http://schemas.microsoft.com/office/powerpoint/2010/main" val="3552803943"/>
+              </p:ext>
+            </p:extLst>
+          </p:nvPr>
+        </p:nvGraphicFramePr>
+        <p:xfrm>
+          <a:off x="2032000" y="719666"/>
+          <a:ext cx="8128000" cy="5418667"/>
+        </p:xfrm>
+        <a:graphic>
+          <a:graphicData uri="http://schemas.openxmlformats.org/drawingml/2006/table">
+            <a:tbl>
+              <a:tblPr firstRow="1" bandRow="1">
+                <a:tableStyleId>{5C22544A-7EE6-4342-B048-85BDC9FD1C3A}</a:tableStyleId>
+              </a:tblPr>
+              <a:tblGrid>
+                <a:gridCol w="2709333">
+                  <a:extLst>
+                    <a:ext uri="{9D8B030D-6E8A-4147-A177-3AD203B41FA5}">
+                      <a16:colId xmlns:a16="http://schemas.microsoft.com/office/drawing/2014/main" val="54348564"/>
+                    </a:ext>
+                  </a:extLst>
+                </a:gridCol>
+                <a:gridCol w="2709333">
+                  <a:extLst>
+                    <a:ext uri="{9D8B030D-6E8A-4147-A177-3AD203B41FA5}">
+                      <a16:colId xmlns:a16="http://schemas.microsoft.com/office/drawing/2014/main" val="2614364924"/>
+                    </a:ext>
+                  </a:extLst>
+                </a:gridCol>
+                <a:gridCol w="2709333">
+                  <a:extLst>
+                    <a:ext uri="{9D8B030D-6E8A-4147-A177-3AD203B41FA5}">
+                      <a16:colId xmlns:a16="http://schemas.microsoft.com/office/drawing/2014/main" val="3772840628"/>
+                    </a:ext>
+                  </a:extLst>
+                </a:gridCol>
+              </a:tblGrid>
+              <a:tr h="370840">
+                <a:tc>
+                  <a:txBody>
+                    <a:bodyPr/>
+                    <a:lstStyle/>
+                    <a:p>
+                      <a:r>
+                        <a:rPr lang="en-US"/>
+                        <a:t>Risk Description</a:t>
+                      </a:r>
+                    </a:p>
+                  </a:txBody>
+                  <a:tcPr/>
+                </a:tc>
+                <a:tc>
+                  <a:txBody>
+                    <a:bodyPr/>
+                    <a:lstStyle/>
+                    <a:p>
+                      <a:r>
+                        <a:rPr lang="en-US"/>
+                        <a:t>Severity</a:t>
+                      </a:r>
+                    </a:p>
+                  </a:txBody>
+                  <a:tcPr/>
+                </a:tc>
+                <a:tc>
+                  <a:txBody>
+                    <a:bodyPr/>
+                    <a:lstStyle/>
+                    <a:p>
+                      <a:r>
+                        <a:rPr lang="en-US"/>
+                        <a:t>Owner</a:t>
+                      </a:r>
+                    </a:p>
+                  </a:txBody>
+                  <a:tcPr/>
+                </a:tc>
+                <a:extLst>
+                  <a:ext uri="{0D108BD9-81ED-4DB2-BD59-A6C34878D82A}">
+                    <a16:rowId xmlns:a16="http://schemas.microsoft.com/office/drawing/2014/main" val="1137461035"/>
+                  </a:ext>
+                </a:extLst>
+              </a:tr>
+              <a:tr h="370840">
+                <a:tc>
+                  <a:txBody>
+                    <a:bodyPr/>
+                    <a:lstStyle/>
+                    <a:p>
+                      <a:r>
+                        <a:rPr lang="en-US"/>
+                        <a:t>If something happens, then something bad will happen to the program</a:t>
+                      </a:r>
+                    </a:p>
+                  </a:txBody>
+                  <a:tcPr/>
+                </a:tc>
+                <a:tc>
+                  <a:txBody>
+                    <a:bodyPr/>
+                    <a:lstStyle/>
+                    <a:p>
+                      <a:r>
+                        <a:rPr lang="en-US"/>
+                        <a:t>High</a:t>
+                      </a:r>
+                    </a:p>
+                  </a:txBody>
+                  <a:tcPr/>
+                </a:tc>
+                <a:tc>
+                  <a:txBody>
+                    <a:bodyPr/>
+                    <a:lstStyle/>
+                    <a:p>
+                      <a:r>
+                        <a:rPr lang="en-US"/>
+                        <a:t>Elevate Bot</a:t>
+                      </a:r>
+                    </a:p>
+                  </a:txBody>
+                  <a:tcPr/>
+                </a:tc>
+                <a:extLst>
+                  <a:ext uri="{0D108BD9-81ED-4DB2-BD59-A6C34878D82A}">
+                    <a16:rowId xmlns:a16="http://schemas.microsoft.com/office/drawing/2014/main" val="177013359"/>
+                  </a:ext>
+                </a:extLst>
+              </a:tr>
+              <a:tr h="370840">
+                <a:tc>
+                  <a:txBody>
+                    <a:bodyPr/>
+                    <a:lstStyle/>
+                    <a:p>
+                      <a:r>
+                        <a:rPr lang="en-US"/>
+                        <a:t>If the bot gets a mind of its own, then we will need to kill it</a:t>
+                      </a:r>
+                    </a:p>
+                  </a:txBody>
+                  <a:tcPr/>
+                </a:tc>
+                <a:tc>
+                  <a:txBody>
+                    <a:bodyPr/>
+                    <a:lstStyle/>
+                    <a:p>
+                      <a:r>
+                        <a:rPr lang="en-US"/>
+                        <a:t>Medium</a:t>
+                      </a:r>
+                    </a:p>
+                  </a:txBody>
+                  <a:tcPr/>
+                </a:tc>
+                <a:tc>
+                  <a:txBody>
+                    <a:bodyPr/>
+                    <a:lstStyle/>
+                    <a:p>
+                      <a:r>
+                        <a:rPr lang="en-US"/>
+                        <a:t>Elevate Bot</a:t>
+                      </a:r>
+                    </a:p>
+                  </a:txBody>
+                  <a:tcPr/>
+                </a:tc>
+                <a:extLst>
+                  <a:ext uri="{0D108BD9-81ED-4DB2-BD59-A6C34878D82A}">
+                    <a16:rowId xmlns:a16="http://schemas.microsoft.com/office/drawing/2014/main" val="3226826857"/>
+                  </a:ext>
+                </a:extLst>
+              </a:tr>
+            </a:tbl>
+          </a:graphicData>
+        </a:graphic>
+      </p:graphicFrame>
+      <p:graphicFrame>
+        <p:nvGraphicFramePr>
+          <p:cNvPr id="8" name="Table 7">
+            <a:extLst>
+              <a:ext uri="{FF2B5EF4-FFF2-40B4-BE49-F238E27FC236}">
+                <a16:creationId xmlns:a16="http://schemas.microsoft.com/office/drawing/2014/main" id="{ED9D793B-D941-4690-9AB3-4BC858F2DBA8}"/>
+              </a:ext>
+            </a:extLst>
+          </p:cNvPr>
+          <p:cNvGraphicFramePr>
+            <a:graphicFrameLocks noGrp="1"/>
+          </p:cNvGraphicFramePr>
+          <p:nvPr>
+            <p:extLst>
+              <p:ext uri="{D42A27DB-BD31-4B8C-83A1-F6EECF244321}">
+                <p14:modId xmlns:p14="http://schemas.microsoft.com/office/powerpoint/2010/main" val="1518026304"/>
+              </p:ext>
+            </p:extLst>
+          </p:nvPr>
+        </p:nvGraphicFramePr>
+        <p:xfrm>
+          <a:off x="2032000" y="719666"/>
+          <a:ext cx="8128000" cy="5418667"/>
+        </p:xfrm>
+        <a:graphic>
+          <a:graphicData uri="http://schemas.openxmlformats.org/drawingml/2006/table">
+            <a:tbl>
+              <a:tblPr firstRow="1" bandRow="1">
+                <a:tableStyleId>{5C22544A-7EE6-4342-B048-85BDC9FD1C3A}</a:tableStyleId>
+              </a:tblPr>
+              <a:tblGrid>
+                <a:gridCol w="2709333">
+                  <a:extLst>
+                    <a:ext uri="{9D8B030D-6E8A-4147-A177-3AD203B41FA5}">
+                      <a16:colId xmlns:a16="http://schemas.microsoft.com/office/drawing/2014/main" val="1536174750"/>
+                    </a:ext>
+                  </a:extLst>
+                </a:gridCol>
+                <a:gridCol w="2709333">
+                  <a:extLst>
+                    <a:ext uri="{9D8B030D-6E8A-4147-A177-3AD203B41FA5}">
+                      <a16:colId xmlns:a16="http://schemas.microsoft.com/office/drawing/2014/main" val="2521029730"/>
+                    </a:ext>
+                  </a:extLst>
+                </a:gridCol>
+                <a:gridCol w="2709333">
+                  <a:extLst>
+                    <a:ext uri="{9D8B030D-6E8A-4147-A177-3AD203B41FA5}">
+                      <a16:colId xmlns:a16="http://schemas.microsoft.com/office/drawing/2014/main" val="165756356"/>
+                    </a:ext>
+                  </a:extLst>
+                </a:gridCol>
+              </a:tblGrid>
+              <a:tr h="370840">
+                <a:tc>
+                  <a:txBody>
+                    <a:bodyPr/>
+                    <a:lstStyle/>
+                    <a:p>
+                      <a:r>
+                        <a:rPr lang="en-US"/>
+                        <a:t>Risk Description</a:t>
+                      </a:r>
+                    </a:p>
+                  </a:txBody>
+                  <a:tcPr/>
+                </a:tc>
+                <a:tc>
+                  <a:txBody>
+                    <a:bodyPr/>
+                    <a:lstStyle/>
+                    <a:p>
+                      <a:r>
+                        <a:rPr lang="en-US"/>
+                        <a:t>Severity</a:t>
+                      </a:r>
+                    </a:p>
+                  </a:txBody>
+                  <a:tcPr/>
+                </a:tc>
+                <a:tc>
+                  <a:txBody>
+                    <a:bodyPr/>
+                    <a:lstStyle/>
+                    <a:p>
+                      <a:r>
+                        <a:rPr lang="en-US"/>
+                        <a:t>Owner</a:t>
+                      </a:r>
+                    </a:p>
+                  </a:txBody>
+                  <a:tcPr/>
+                </a:tc>
+                <a:extLst>
+                  <a:ext uri="{0D108BD9-81ED-4DB2-BD59-A6C34878D82A}">
+                    <a16:rowId xmlns:a16="http://schemas.microsoft.com/office/drawing/2014/main" val="1882771979"/>
+                  </a:ext>
+                </a:extLst>
+              </a:tr>
+              <a:tr h="370840">
+                <a:tc>
+                  <a:txBody>
+                    <a:bodyPr/>
+                    <a:lstStyle/>
+                    <a:p>
+                      <a:r>
+                        <a:rPr lang="en-US"/>
+                        <a:t>If something happens, then something bad will happen to the program</a:t>
+                      </a:r>
+                    </a:p>
+                  </a:txBody>
+                  <a:tcPr/>
+                </a:tc>
+                <a:tc>
+                  <a:txBody>
+                    <a:bodyPr/>
+                    <a:lstStyle/>
+                    <a:p>
+                      <a:r>
+                        <a:rPr lang="en-US"/>
+                        <a:t>High</a:t>
+                      </a:r>
+                    </a:p>
+                  </a:txBody>
+                  <a:tcPr/>
+                </a:tc>
+                <a:tc>
+                  <a:txBody>
+                    <a:bodyPr/>
+                    <a:lstStyle/>
+                    <a:p>
+                      <a:r>
+                        <a:rPr lang="en-US"/>
+                        <a:t>Elevate Bot</a:t>
+                      </a:r>
+                    </a:p>
+                  </a:txBody>
+                  <a:tcPr/>
+                </a:tc>
+                <a:extLst>
+                  <a:ext uri="{0D108BD9-81ED-4DB2-BD59-A6C34878D82A}">
+                    <a16:rowId xmlns:a16="http://schemas.microsoft.com/office/drawing/2014/main" val="3774382050"/>
+                  </a:ext>
+                </a:extLst>
+              </a:tr>
+              <a:tr h="370840">
+                <a:tc>
+                  <a:txBody>
+                    <a:bodyPr/>
+                    <a:lstStyle/>
+                    <a:p>
+                      <a:r>
+                        <a:rPr lang="en-US"/>
+                        <a:t>If the bot gets a mind of its own, then we will need to kill it</a:t>
+                      </a:r>
+                    </a:p>
+                  </a:txBody>
+                  <a:tcPr/>
+                </a:tc>
+                <a:tc>
+                  <a:txBody>
+                    <a:bodyPr/>
+                    <a:lstStyle/>
+                    <a:p>
+                      <a:r>
+                        <a:rPr lang="en-US"/>
+                        <a:t>Medium</a:t>
+                      </a:r>
+                    </a:p>
+                  </a:txBody>
+                  <a:tcPr/>
+                </a:tc>
+                <a:tc>
+                  <a:txBody>
+                    <a:bodyPr/>
+                    <a:lstStyle/>
+                    <a:p>
+                      <a:r>
+                        <a:rPr lang="en-US"/>
+                        <a:t>Elevate Bot</a:t>
+                      </a:r>
+                    </a:p>
+                  </a:txBody>
+                  <a:tcPr/>
+                </a:tc>
+                <a:extLst>
+                  <a:ext uri="{0D108BD9-81ED-4DB2-BD59-A6C34878D82A}">
+                    <a16:rowId xmlns:a16="http://schemas.microsoft.com/office/drawing/2014/main" val="674042823"/>
                   </a:ext>
                 </a:extLst>
               </a:tr>

</xml_diff>

<commit_message>
Commit fixed extract table bug (It randomly stopped working had to recreate a new one)
</commit_message>
<xml_diff>
--- a/Data/Input/Robotic Process Automation PMO.pptx
+++ b/Data/Input/Robotic Process Automation PMO.pptx
@@ -272,7 +272,7 @@
           <a:p>
             <a:fld id="{31D2A231-A7A4-4168-91EA-2B6389CA866E}" type="datetimeFigureOut">
               <a:rPr lang="en-US" smtClean="0"/>
-              <a:t>4/15/2020</a:t>
+              <a:t>4/16/2020</a:t>
             </a:fld>
             <a:endParaRPr lang="en-US"/>
           </a:p>
@@ -470,7 +470,7 @@
           <a:p>
             <a:fld id="{31D2A231-A7A4-4168-91EA-2B6389CA866E}" type="datetimeFigureOut">
               <a:rPr lang="en-US" smtClean="0"/>
-              <a:t>4/15/2020</a:t>
+              <a:t>4/16/2020</a:t>
             </a:fld>
             <a:endParaRPr lang="en-US"/>
           </a:p>
@@ -678,7 +678,7 @@
           <a:p>
             <a:fld id="{31D2A231-A7A4-4168-91EA-2B6389CA866E}" type="datetimeFigureOut">
               <a:rPr lang="en-US" smtClean="0"/>
-              <a:t>4/15/2020</a:t>
+              <a:t>4/16/2020</a:t>
             </a:fld>
             <a:endParaRPr lang="en-US"/>
           </a:p>
@@ -876,7 +876,7 @@
           <a:p>
             <a:fld id="{31D2A231-A7A4-4168-91EA-2B6389CA866E}" type="datetimeFigureOut">
               <a:rPr lang="en-US" smtClean="0"/>
-              <a:t>4/15/2020</a:t>
+              <a:t>4/16/2020</a:t>
             </a:fld>
             <a:endParaRPr lang="en-US"/>
           </a:p>
@@ -1151,7 +1151,7 @@
           <a:p>
             <a:fld id="{31D2A231-A7A4-4168-91EA-2B6389CA866E}" type="datetimeFigureOut">
               <a:rPr lang="en-US" smtClean="0"/>
-              <a:t>4/15/2020</a:t>
+              <a:t>4/16/2020</a:t>
             </a:fld>
             <a:endParaRPr lang="en-US"/>
           </a:p>
@@ -1416,7 +1416,7 @@
           <a:p>
             <a:fld id="{31D2A231-A7A4-4168-91EA-2B6389CA866E}" type="datetimeFigureOut">
               <a:rPr lang="en-US" smtClean="0"/>
-              <a:t>4/15/2020</a:t>
+              <a:t>4/16/2020</a:t>
             </a:fld>
             <a:endParaRPr lang="en-US"/>
           </a:p>
@@ -1828,7 +1828,7 @@
           <a:p>
             <a:fld id="{31D2A231-A7A4-4168-91EA-2B6389CA866E}" type="datetimeFigureOut">
               <a:rPr lang="en-US" smtClean="0"/>
-              <a:t>4/15/2020</a:t>
+              <a:t>4/16/2020</a:t>
             </a:fld>
             <a:endParaRPr lang="en-US"/>
           </a:p>
@@ -1969,7 +1969,7 @@
           <a:p>
             <a:fld id="{31D2A231-A7A4-4168-91EA-2B6389CA866E}" type="datetimeFigureOut">
               <a:rPr lang="en-US" smtClean="0"/>
-              <a:t>4/15/2020</a:t>
+              <a:t>4/16/2020</a:t>
             </a:fld>
             <a:endParaRPr lang="en-US"/>
           </a:p>
@@ -2082,7 +2082,7 @@
           <a:p>
             <a:fld id="{31D2A231-A7A4-4168-91EA-2B6389CA866E}" type="datetimeFigureOut">
               <a:rPr lang="en-US" smtClean="0"/>
-              <a:t>4/15/2020</a:t>
+              <a:t>4/16/2020</a:t>
             </a:fld>
             <a:endParaRPr lang="en-US"/>
           </a:p>
@@ -2393,7 +2393,7 @@
           <a:p>
             <a:fld id="{31D2A231-A7A4-4168-91EA-2B6389CA866E}" type="datetimeFigureOut">
               <a:rPr lang="en-US" smtClean="0"/>
-              <a:t>4/15/2020</a:t>
+              <a:t>4/16/2020</a:t>
             </a:fld>
             <a:endParaRPr lang="en-US"/>
           </a:p>
@@ -2681,7 +2681,7 @@
           <a:p>
             <a:fld id="{31D2A231-A7A4-4168-91EA-2B6389CA866E}" type="datetimeFigureOut">
               <a:rPr lang="en-US" smtClean="0"/>
-              <a:t>4/15/2020</a:t>
+              <a:t>4/16/2020</a:t>
             </a:fld>
             <a:endParaRPr lang="en-US"/>
           </a:p>
@@ -2922,7 +2922,7 @@
           <a:p>
             <a:fld id="{31D2A231-A7A4-4168-91EA-2B6389CA866E}" type="datetimeFigureOut">
               <a:rPr lang="en-US" smtClean="0"/>
-              <a:t>4/15/2020</a:t>
+              <a:t>4/16/2020</a:t>
             </a:fld>
             <a:endParaRPr lang="en-US"/>
           </a:p>
@@ -3686,7 +3686,7 @@
           <a:p>
             <a:r>
               <a:rPr lang="en-US" sz="2000" dirty="0"/>
-              <a:t>Prepared on: 04/15/2020</a:t>
+              <a:t>Prepared on:</a:t>
             </a:r>
           </a:p>
         </p:txBody>
@@ -3921,413 +3921,12 @@
           </a:prstGeom>
         </p:spPr>
       </p:pic>
-      <p:sp>
-        <p:nvSpPr>
-          <p:cNvPr id="8" name="Content Placeholder 2">
-            <a:extLst>
-              <a:ext uri="{FF2B5EF4-FFF2-40B4-BE49-F238E27FC236}">
-                <a16:creationId xmlns:a16="http://schemas.microsoft.com/office/drawing/2014/main" id="{992CA746-BE9D-438D-B701-5C0EC930B734}"/>
-              </a:ext>
-            </a:extLst>
-          </p:cNvPr>
-          <p:cNvSpPr txBox="1">
-            <a:spLocks/>
-          </p:cNvSpPr>
-          <p:nvPr/>
-        </p:nvSpPr>
-        <p:spPr>
-          <a:xfrm>
-            <a:off x="838200" y="1386638"/>
-            <a:ext cx="4838700" cy="651712"/>
-          </a:xfrm>
-          <a:prstGeom prst="rect">
-            <a:avLst/>
-          </a:prstGeom>
-        </p:spPr>
-        <p:txBody>
-          <a:bodyPr vert="horz" lIns="91440" tIns="45720" rIns="91440" bIns="45720" rtlCol="0">
-            <a:normAutofit/>
-          </a:bodyPr>
-          <a:lstStyle>
-            <a:lvl1pPr marL="228600" indent="-228600" algn="l" defTabSz="914400" rtl="0" eaLnBrk="1" latinLnBrk="0" hangingPunct="1">
-              <a:lnSpc>
-                <a:spcPct val="90000"/>
-              </a:lnSpc>
-              <a:spcBef>
-                <a:spcPts val="1000"/>
-              </a:spcBef>
-              <a:buFont typeface="Arial" panose="020B0604020202020204" pitchFamily="34" charset="0"/>
-              <a:buChar char="•"/>
-              <a:defRPr sz="2800" kern="1200">
-                <a:solidFill>
-                  <a:schemeClr val="tx1"/>
-                </a:solidFill>
-                <a:latin typeface="+mn-lt"/>
-                <a:ea typeface="+mn-ea"/>
-                <a:cs typeface="+mn-cs"/>
-              </a:defRPr>
-            </a:lvl1pPr>
-            <a:lvl2pPr marL="685800" indent="-228600" algn="l" defTabSz="914400" rtl="0" eaLnBrk="1" latinLnBrk="0" hangingPunct="1">
-              <a:lnSpc>
-                <a:spcPct val="90000"/>
-              </a:lnSpc>
-              <a:spcBef>
-                <a:spcPts val="500"/>
-              </a:spcBef>
-              <a:buFont typeface="Arial" panose="020B0604020202020204" pitchFamily="34" charset="0"/>
-              <a:buChar char="•"/>
-              <a:defRPr sz="2400" kern="1200">
-                <a:solidFill>
-                  <a:schemeClr val="tx1"/>
-                </a:solidFill>
-                <a:latin typeface="+mn-lt"/>
-                <a:ea typeface="+mn-ea"/>
-                <a:cs typeface="+mn-cs"/>
-              </a:defRPr>
-            </a:lvl2pPr>
-            <a:lvl3pPr marL="1143000" indent="-228600" algn="l" defTabSz="914400" rtl="0" eaLnBrk="1" latinLnBrk="0" hangingPunct="1">
-              <a:lnSpc>
-                <a:spcPct val="90000"/>
-              </a:lnSpc>
-              <a:spcBef>
-                <a:spcPts val="500"/>
-              </a:spcBef>
-              <a:buFont typeface="Arial" panose="020B0604020202020204" pitchFamily="34" charset="0"/>
-              <a:buChar char="•"/>
-              <a:defRPr sz="2000" kern="1200">
-                <a:solidFill>
-                  <a:schemeClr val="tx1"/>
-                </a:solidFill>
-                <a:latin typeface="+mn-lt"/>
-                <a:ea typeface="+mn-ea"/>
-                <a:cs typeface="+mn-cs"/>
-              </a:defRPr>
-            </a:lvl3pPr>
-            <a:lvl4pPr marL="1600200" indent="-228600" algn="l" defTabSz="914400" rtl="0" eaLnBrk="1" latinLnBrk="0" hangingPunct="1">
-              <a:lnSpc>
-                <a:spcPct val="90000"/>
-              </a:lnSpc>
-              <a:spcBef>
-                <a:spcPts val="500"/>
-              </a:spcBef>
-              <a:buFont typeface="Arial" panose="020B0604020202020204" pitchFamily="34" charset="0"/>
-              <a:buChar char="•"/>
-              <a:defRPr sz="1800" kern="1200">
-                <a:solidFill>
-                  <a:schemeClr val="tx1"/>
-                </a:solidFill>
-                <a:latin typeface="+mn-lt"/>
-                <a:ea typeface="+mn-ea"/>
-                <a:cs typeface="+mn-cs"/>
-              </a:defRPr>
-            </a:lvl4pPr>
-            <a:lvl5pPr marL="2057400" indent="-228600" algn="l" defTabSz="914400" rtl="0" eaLnBrk="1" latinLnBrk="0" hangingPunct="1">
-              <a:lnSpc>
-                <a:spcPct val="90000"/>
-              </a:lnSpc>
-              <a:spcBef>
-                <a:spcPts val="500"/>
-              </a:spcBef>
-              <a:buFont typeface="Arial" panose="020B0604020202020204" pitchFamily="34" charset="0"/>
-              <a:buChar char="•"/>
-              <a:defRPr sz="1800" kern="1200">
-                <a:solidFill>
-                  <a:schemeClr val="tx1"/>
-                </a:solidFill>
-                <a:latin typeface="+mn-lt"/>
-                <a:ea typeface="+mn-ea"/>
-                <a:cs typeface="+mn-cs"/>
-              </a:defRPr>
-            </a:lvl5pPr>
-            <a:lvl6pPr marL="2514600" indent="-228600" algn="l" defTabSz="914400" rtl="0" eaLnBrk="1" latinLnBrk="0" hangingPunct="1">
-              <a:lnSpc>
-                <a:spcPct val="90000"/>
-              </a:lnSpc>
-              <a:spcBef>
-                <a:spcPts val="500"/>
-              </a:spcBef>
-              <a:buFont typeface="Arial" panose="020B0604020202020204" pitchFamily="34" charset="0"/>
-              <a:buChar char="•"/>
-              <a:defRPr sz="1800" kern="1200">
-                <a:solidFill>
-                  <a:schemeClr val="tx1"/>
-                </a:solidFill>
-                <a:latin typeface="+mn-lt"/>
-                <a:ea typeface="+mn-ea"/>
-                <a:cs typeface="+mn-cs"/>
-              </a:defRPr>
-            </a:lvl6pPr>
-            <a:lvl7pPr marL="2971800" indent="-228600" algn="l" defTabSz="914400" rtl="0" eaLnBrk="1" latinLnBrk="0" hangingPunct="1">
-              <a:lnSpc>
-                <a:spcPct val="90000"/>
-              </a:lnSpc>
-              <a:spcBef>
-                <a:spcPts val="500"/>
-              </a:spcBef>
-              <a:buFont typeface="Arial" panose="020B0604020202020204" pitchFamily="34" charset="0"/>
-              <a:buChar char="•"/>
-              <a:defRPr sz="1800" kern="1200">
-                <a:solidFill>
-                  <a:schemeClr val="tx1"/>
-                </a:solidFill>
-                <a:latin typeface="+mn-lt"/>
-                <a:ea typeface="+mn-ea"/>
-                <a:cs typeface="+mn-cs"/>
-              </a:defRPr>
-            </a:lvl7pPr>
-            <a:lvl8pPr marL="3429000" indent="-228600" algn="l" defTabSz="914400" rtl="0" eaLnBrk="1" latinLnBrk="0" hangingPunct="1">
-              <a:lnSpc>
-                <a:spcPct val="90000"/>
-              </a:lnSpc>
-              <a:spcBef>
-                <a:spcPts val="500"/>
-              </a:spcBef>
-              <a:buFont typeface="Arial" panose="020B0604020202020204" pitchFamily="34" charset="0"/>
-              <a:buChar char="•"/>
-              <a:defRPr sz="1800" kern="1200">
-                <a:solidFill>
-                  <a:schemeClr val="tx1"/>
-                </a:solidFill>
-                <a:latin typeface="+mn-lt"/>
-                <a:ea typeface="+mn-ea"/>
-                <a:cs typeface="+mn-cs"/>
-              </a:defRPr>
-            </a:lvl8pPr>
-            <a:lvl9pPr marL="3886200" indent="-228600" algn="l" defTabSz="914400" rtl="0" eaLnBrk="1" latinLnBrk="0" hangingPunct="1">
-              <a:lnSpc>
-                <a:spcPct val="90000"/>
-              </a:lnSpc>
-              <a:spcBef>
-                <a:spcPts val="500"/>
-              </a:spcBef>
-              <a:buFont typeface="Arial" panose="020B0604020202020204" pitchFamily="34" charset="0"/>
-              <a:buChar char="•"/>
-              <a:defRPr sz="1800" kern="1200">
-                <a:solidFill>
-                  <a:schemeClr val="tx1"/>
-                </a:solidFill>
-                <a:latin typeface="+mn-lt"/>
-                <a:ea typeface="+mn-ea"/>
-                <a:cs typeface="+mn-cs"/>
-              </a:defRPr>
-            </a:lvl9pPr>
-          </a:lstStyle>
-          <a:p>
-            <a:r>
-              <a:rPr lang="en-US" dirty="0"/>
-              <a:t>Accomplishments for Week of </a:t>
-            </a:r>
-          </a:p>
-        </p:txBody>
-      </p:sp>
-      <p:sp>
-        <p:nvSpPr>
-          <p:cNvPr id="9" name="Content Placeholder 2">
-            <a:extLst>
-              <a:ext uri="{FF2B5EF4-FFF2-40B4-BE49-F238E27FC236}">
-                <a16:creationId xmlns:a16="http://schemas.microsoft.com/office/drawing/2014/main" id="{AC25244A-5598-4F75-9490-8678E53660EB}"/>
-              </a:ext>
-            </a:extLst>
-          </p:cNvPr>
-          <p:cNvSpPr txBox="1">
-            <a:spLocks/>
-          </p:cNvSpPr>
-          <p:nvPr/>
-        </p:nvSpPr>
-        <p:spPr>
-          <a:xfrm>
-            <a:off x="5495925" y="1386638"/>
-            <a:ext cx="4838700" cy="651712"/>
-          </a:xfrm>
-          <a:prstGeom prst="rect">
-            <a:avLst/>
-          </a:prstGeom>
-        </p:spPr>
-        <p:txBody>
-          <a:bodyPr vert="horz" lIns="91440" tIns="45720" rIns="91440" bIns="45720" rtlCol="0">
-            <a:normAutofit/>
-          </a:bodyPr>
-          <a:lstStyle>
-            <a:lvl1pPr marL="228600" indent="-228600" algn="l" defTabSz="914400" rtl="0" eaLnBrk="1" latinLnBrk="0" hangingPunct="1">
-              <a:lnSpc>
-                <a:spcPct val="90000"/>
-              </a:lnSpc>
-              <a:spcBef>
-                <a:spcPts val="1000"/>
-              </a:spcBef>
-              <a:buFont typeface="Arial" panose="020B0604020202020204" pitchFamily="34" charset="0"/>
-              <a:buChar char="•"/>
-              <a:defRPr sz="2800" kern="1200">
-                <a:solidFill>
-                  <a:schemeClr val="tx1"/>
-                </a:solidFill>
-                <a:latin typeface="+mn-lt"/>
-                <a:ea typeface="+mn-ea"/>
-                <a:cs typeface="+mn-cs"/>
-              </a:defRPr>
-            </a:lvl1pPr>
-            <a:lvl2pPr marL="685800" indent="-228600" algn="l" defTabSz="914400" rtl="0" eaLnBrk="1" latinLnBrk="0" hangingPunct="1">
-              <a:lnSpc>
-                <a:spcPct val="90000"/>
-              </a:lnSpc>
-              <a:spcBef>
-                <a:spcPts val="500"/>
-              </a:spcBef>
-              <a:buFont typeface="Arial" panose="020B0604020202020204" pitchFamily="34" charset="0"/>
-              <a:buChar char="•"/>
-              <a:defRPr sz="2400" kern="1200">
-                <a:solidFill>
-                  <a:schemeClr val="tx1"/>
-                </a:solidFill>
-                <a:latin typeface="+mn-lt"/>
-                <a:ea typeface="+mn-ea"/>
-                <a:cs typeface="+mn-cs"/>
-              </a:defRPr>
-            </a:lvl2pPr>
-            <a:lvl3pPr marL="1143000" indent="-228600" algn="l" defTabSz="914400" rtl="0" eaLnBrk="1" latinLnBrk="0" hangingPunct="1">
-              <a:lnSpc>
-                <a:spcPct val="90000"/>
-              </a:lnSpc>
-              <a:spcBef>
-                <a:spcPts val="500"/>
-              </a:spcBef>
-              <a:buFont typeface="Arial" panose="020B0604020202020204" pitchFamily="34" charset="0"/>
-              <a:buChar char="•"/>
-              <a:defRPr sz="2000" kern="1200">
-                <a:solidFill>
-                  <a:schemeClr val="tx1"/>
-                </a:solidFill>
-                <a:latin typeface="+mn-lt"/>
-                <a:ea typeface="+mn-ea"/>
-                <a:cs typeface="+mn-cs"/>
-              </a:defRPr>
-            </a:lvl3pPr>
-            <a:lvl4pPr marL="1600200" indent="-228600" algn="l" defTabSz="914400" rtl="0" eaLnBrk="1" latinLnBrk="0" hangingPunct="1">
-              <a:lnSpc>
-                <a:spcPct val="90000"/>
-              </a:lnSpc>
-              <a:spcBef>
-                <a:spcPts val="500"/>
-              </a:spcBef>
-              <a:buFont typeface="Arial" panose="020B0604020202020204" pitchFamily="34" charset="0"/>
-              <a:buChar char="•"/>
-              <a:defRPr sz="1800" kern="1200">
-                <a:solidFill>
-                  <a:schemeClr val="tx1"/>
-                </a:solidFill>
-                <a:latin typeface="+mn-lt"/>
-                <a:ea typeface="+mn-ea"/>
-                <a:cs typeface="+mn-cs"/>
-              </a:defRPr>
-            </a:lvl4pPr>
-            <a:lvl5pPr marL="2057400" indent="-228600" algn="l" defTabSz="914400" rtl="0" eaLnBrk="1" latinLnBrk="0" hangingPunct="1">
-              <a:lnSpc>
-                <a:spcPct val="90000"/>
-              </a:lnSpc>
-              <a:spcBef>
-                <a:spcPts val="500"/>
-              </a:spcBef>
-              <a:buFont typeface="Arial" panose="020B0604020202020204" pitchFamily="34" charset="0"/>
-              <a:buChar char="•"/>
-              <a:defRPr sz="1800" kern="1200">
-                <a:solidFill>
-                  <a:schemeClr val="tx1"/>
-                </a:solidFill>
-                <a:latin typeface="+mn-lt"/>
-                <a:ea typeface="+mn-ea"/>
-                <a:cs typeface="+mn-cs"/>
-              </a:defRPr>
-            </a:lvl5pPr>
-            <a:lvl6pPr marL="2514600" indent="-228600" algn="l" defTabSz="914400" rtl="0" eaLnBrk="1" latinLnBrk="0" hangingPunct="1">
-              <a:lnSpc>
-                <a:spcPct val="90000"/>
-              </a:lnSpc>
-              <a:spcBef>
-                <a:spcPts val="500"/>
-              </a:spcBef>
-              <a:buFont typeface="Arial" panose="020B0604020202020204" pitchFamily="34" charset="0"/>
-              <a:buChar char="•"/>
-              <a:defRPr sz="1800" kern="1200">
-                <a:solidFill>
-                  <a:schemeClr val="tx1"/>
-                </a:solidFill>
-                <a:latin typeface="+mn-lt"/>
-                <a:ea typeface="+mn-ea"/>
-                <a:cs typeface="+mn-cs"/>
-              </a:defRPr>
-            </a:lvl6pPr>
-            <a:lvl7pPr marL="2971800" indent="-228600" algn="l" defTabSz="914400" rtl="0" eaLnBrk="1" latinLnBrk="0" hangingPunct="1">
-              <a:lnSpc>
-                <a:spcPct val="90000"/>
-              </a:lnSpc>
-              <a:spcBef>
-                <a:spcPts val="500"/>
-              </a:spcBef>
-              <a:buFont typeface="Arial" panose="020B0604020202020204" pitchFamily="34" charset="0"/>
-              <a:buChar char="•"/>
-              <a:defRPr sz="1800" kern="1200">
-                <a:solidFill>
-                  <a:schemeClr val="tx1"/>
-                </a:solidFill>
-                <a:latin typeface="+mn-lt"/>
-                <a:ea typeface="+mn-ea"/>
-                <a:cs typeface="+mn-cs"/>
-              </a:defRPr>
-            </a:lvl7pPr>
-            <a:lvl8pPr marL="3429000" indent="-228600" algn="l" defTabSz="914400" rtl="0" eaLnBrk="1" latinLnBrk="0" hangingPunct="1">
-              <a:lnSpc>
-                <a:spcPct val="90000"/>
-              </a:lnSpc>
-              <a:spcBef>
-                <a:spcPts val="500"/>
-              </a:spcBef>
-              <a:buFont typeface="Arial" panose="020B0604020202020204" pitchFamily="34" charset="0"/>
-              <a:buChar char="•"/>
-              <a:defRPr sz="1800" kern="1200">
-                <a:solidFill>
-                  <a:schemeClr val="tx1"/>
-                </a:solidFill>
-                <a:latin typeface="+mn-lt"/>
-                <a:ea typeface="+mn-ea"/>
-                <a:cs typeface="+mn-cs"/>
-              </a:defRPr>
-            </a:lvl8pPr>
-            <a:lvl9pPr marL="3886200" indent="-228600" algn="l" defTabSz="914400" rtl="0" eaLnBrk="1" latinLnBrk="0" hangingPunct="1">
-              <a:lnSpc>
-                <a:spcPct val="90000"/>
-              </a:lnSpc>
-              <a:spcBef>
-                <a:spcPts val="500"/>
-              </a:spcBef>
-              <a:buFont typeface="Arial" panose="020B0604020202020204" pitchFamily="34" charset="0"/>
-              <a:buChar char="•"/>
-              <a:defRPr sz="1800" kern="1200">
-                <a:solidFill>
-                  <a:schemeClr val="tx1"/>
-                </a:solidFill>
-                <a:latin typeface="+mn-lt"/>
-                <a:ea typeface="+mn-ea"/>
-                <a:cs typeface="+mn-cs"/>
-              </a:defRPr>
-            </a:lvl9pPr>
-          </a:lstStyle>
-          <a:p>
-            <a:pPr marL="0" indent="0">
-              <a:buNone/>
-            </a:pPr>
-            <a:r>
-              <a:rPr lang="en-US" dirty="0"/>
-              <a:t>04/13/2020 – 04/17/2020</a:t>
-            </a:r>
-          </a:p>
-        </p:txBody>
-      </p:sp>
       <p:graphicFrame>
         <p:nvGraphicFramePr>
-          <p:cNvPr id="10" name="Table 10">
-            <a:extLst>
-              <a:ext uri="{FF2B5EF4-FFF2-40B4-BE49-F238E27FC236}">
-                <a16:creationId xmlns:a16="http://schemas.microsoft.com/office/drawing/2014/main" id="{CEB7CCFE-13A4-4566-B3D7-E5D6414E5689}"/>
+          <p:cNvPr id="3" name="Table 2">
+            <a:extLst>
+              <a:ext uri="{FF2B5EF4-FFF2-40B4-BE49-F238E27FC236}">
+                <a16:creationId xmlns:a16="http://schemas.microsoft.com/office/drawing/2014/main" id="{B993B679-EF17-4BB9-98F3-BA04BE888095}"/>
               </a:ext>
             </a:extLst>
           </p:cNvPr>
@@ -4337,353 +3936,7 @@
           <p:nvPr>
             <p:extLst>
               <p:ext uri="{D42A27DB-BD31-4B8C-83A1-F6EECF244321}">
-                <p14:modId xmlns:p14="http://schemas.microsoft.com/office/powerpoint/2010/main" val="2924733135"/>
-              </p:ext>
-            </p:extLst>
-          </p:nvPr>
-        </p:nvGraphicFramePr>
-        <p:xfrm>
-          <a:off x="2032000" y="2512016"/>
-          <a:ext cx="8128000" cy="1483360"/>
-        </p:xfrm>
-        <a:graphic>
-          <a:graphicData uri="http://schemas.openxmlformats.org/drawingml/2006/table">
-            <a:tbl>
-              <a:tblPr firstRow="1" bandRow="1">
-                <a:tableStyleId>{B301B821-A1FF-4177-AEE7-76D212191A09}</a:tableStyleId>
-              </a:tblPr>
-              <a:tblGrid>
-                <a:gridCol w="670050">
-                  <a:extLst>
-                    <a:ext uri="{9D8B030D-6E8A-4147-A177-3AD203B41FA5}">
-                      <a16:colId xmlns:a16="http://schemas.microsoft.com/office/drawing/2014/main" val="3857336290"/>
-                    </a:ext>
-                  </a:extLst>
-                </a:gridCol>
-                <a:gridCol w="4336925">
-                  <a:extLst>
-                    <a:ext uri="{9D8B030D-6E8A-4147-A177-3AD203B41FA5}">
-                      <a16:colId xmlns:a16="http://schemas.microsoft.com/office/drawing/2014/main" val="3521509764"/>
-                    </a:ext>
-                  </a:extLst>
-                </a:gridCol>
-                <a:gridCol w="3121025">
-                  <a:extLst>
-                    <a:ext uri="{9D8B030D-6E8A-4147-A177-3AD203B41FA5}">
-                      <a16:colId xmlns:a16="http://schemas.microsoft.com/office/drawing/2014/main" val="1257671124"/>
-                    </a:ext>
-                  </a:extLst>
-                </a:gridCol>
-              </a:tblGrid>
-              <a:tr h="370840">
-                <a:tc>
-                  <a:txBody>
-                    <a:bodyPr/>
-                    <a:lstStyle/>
-                    <a:p>
-                      <a:endParaRPr lang="en-US" dirty="0"/>
-                    </a:p>
-                  </a:txBody>
-                  <a:tcPr/>
-                </a:tc>
-                <a:tc>
-                  <a:txBody>
-                    <a:bodyPr/>
-                    <a:lstStyle/>
-                    <a:p>
-                      <a:r>
-                        <a:rPr lang="en-US" dirty="0"/>
-                        <a:t>Accomplishment</a:t>
-                      </a:r>
-                    </a:p>
-                  </a:txBody>
-                  <a:tcPr/>
-                </a:tc>
-                <a:tc>
-                  <a:txBody>
-                    <a:bodyPr/>
-                    <a:lstStyle/>
-                    <a:p>
-                      <a:r>
-                        <a:rPr lang="en-US" dirty="0"/>
-                        <a:t>Assignee</a:t>
-                      </a:r>
-                    </a:p>
-                  </a:txBody>
-                  <a:tcPr/>
-                </a:tc>
-                <a:extLst>
-                  <a:ext uri="{0D108BD9-81ED-4DB2-BD59-A6C34878D82A}">
-                    <a16:rowId xmlns:a16="http://schemas.microsoft.com/office/drawing/2014/main" val="5578277"/>
-                  </a:ext>
-                </a:extLst>
-              </a:tr>
-              <a:tr h="370840">
-                <a:tc>
-                  <a:txBody>
-                    <a:bodyPr/>
-                    <a:lstStyle/>
-                    <a:p>
-                      <a:endParaRPr lang="en-US" dirty="0"/>
-                    </a:p>
-                  </a:txBody>
-                  <a:tcPr/>
-                </a:tc>
-                <a:tc>
-                  <a:txBody>
-                    <a:bodyPr/>
-                    <a:lstStyle/>
-                    <a:p>
-                      <a:r>
-                        <a:rPr lang="en-US" dirty="0"/>
-                        <a:t>Accomplishment 1</a:t>
-                      </a:r>
-                    </a:p>
-                  </a:txBody>
-                  <a:tcPr/>
-                </a:tc>
-                <a:tc>
-                  <a:txBody>
-                    <a:bodyPr/>
-                    <a:lstStyle/>
-                    <a:p>
-                      <a:r>
-                        <a:rPr lang="en-US" dirty="0"/>
-                        <a:t>Elevate Bot</a:t>
-                      </a:r>
-                    </a:p>
-                  </a:txBody>
-                  <a:tcPr/>
-                </a:tc>
-                <a:extLst>
-                  <a:ext uri="{0D108BD9-81ED-4DB2-BD59-A6C34878D82A}">
-                    <a16:rowId xmlns:a16="http://schemas.microsoft.com/office/drawing/2014/main" val="61454587"/>
-                  </a:ext>
-                </a:extLst>
-              </a:tr>
-              <a:tr h="370840">
-                <a:tc>
-                  <a:txBody>
-                    <a:bodyPr/>
-                    <a:lstStyle/>
-                    <a:p>
-                      <a:endParaRPr lang="en-US" dirty="0"/>
-                    </a:p>
-                  </a:txBody>
-                  <a:tcPr/>
-                </a:tc>
-                <a:tc>
-                  <a:txBody>
-                    <a:bodyPr/>
-                    <a:lstStyle/>
-                    <a:p>
-                      <a:r>
-                        <a:rPr lang="en-US" dirty="0"/>
-                        <a:t>Accomplishment 2</a:t>
-                      </a:r>
-                    </a:p>
-                  </a:txBody>
-                  <a:tcPr/>
-                </a:tc>
-                <a:tc>
-                  <a:txBody>
-                    <a:bodyPr/>
-                    <a:lstStyle/>
-                    <a:p>
-                      <a:r>
-                        <a:rPr lang="en-US" dirty="0"/>
-                        <a:t>Elevate Bot</a:t>
-                      </a:r>
-                    </a:p>
-                  </a:txBody>
-                  <a:tcPr/>
-                </a:tc>
-                <a:extLst>
-                  <a:ext uri="{0D108BD9-81ED-4DB2-BD59-A6C34878D82A}">
-                    <a16:rowId xmlns:a16="http://schemas.microsoft.com/office/drawing/2014/main" val="3189033733"/>
-                  </a:ext>
-                </a:extLst>
-              </a:tr>
-              <a:tr h="370840">
-                <a:tc>
-                  <a:txBody>
-                    <a:bodyPr/>
-                    <a:lstStyle/>
-                    <a:p>
-                      <a:endParaRPr lang="en-US" dirty="0"/>
-                    </a:p>
-                  </a:txBody>
-                  <a:tcPr/>
-                </a:tc>
-                <a:tc>
-                  <a:txBody>
-                    <a:bodyPr/>
-                    <a:lstStyle/>
-                    <a:p>
-                      <a:r>
-                        <a:rPr lang="en-US" dirty="0"/>
-                        <a:t>Accomplishment 3</a:t>
-                      </a:r>
-                    </a:p>
-                  </a:txBody>
-                  <a:tcPr/>
-                </a:tc>
-                <a:tc>
-                  <a:txBody>
-                    <a:bodyPr/>
-                    <a:lstStyle/>
-                    <a:p>
-                      <a:r>
-                        <a:rPr lang="en-US" dirty="0"/>
-                        <a:t>Elevate Bot</a:t>
-                      </a:r>
-                    </a:p>
-                  </a:txBody>
-                  <a:tcPr/>
-                </a:tc>
-                <a:extLst>
-                  <a:ext uri="{0D108BD9-81ED-4DB2-BD59-A6C34878D82A}">
-                    <a16:rowId xmlns:a16="http://schemas.microsoft.com/office/drawing/2014/main" val="381752107"/>
-                  </a:ext>
-                </a:extLst>
-              </a:tr>
-            </a:tbl>
-          </a:graphicData>
-        </a:graphic>
-      </p:graphicFrame>
-      <p:pic>
-        <p:nvPicPr>
-          <p:cNvPr id="13" name="Graphic 12" descr="Checkmark">
-            <a:extLst>
-              <a:ext uri="{FF2B5EF4-FFF2-40B4-BE49-F238E27FC236}">
-                <a16:creationId xmlns:a16="http://schemas.microsoft.com/office/drawing/2014/main" id="{0522FBAB-2303-49B0-93B6-91AB8F20D694}"/>
-              </a:ext>
-            </a:extLst>
-          </p:cNvPr>
-          <p:cNvPicPr>
-            <a:picLocks noChangeAspect="1"/>
-          </p:cNvPicPr>
-          <p:nvPr/>
-        </p:nvPicPr>
-        <p:blipFill>
-          <a:blip r:embed="rId5">
-            <a:extLst>
-              <a:ext uri="{28A0092B-C50C-407E-A947-70E740481C1C}">
-                <a14:useLocalDpi xmlns:a14="http://schemas.microsoft.com/office/drawing/2010/main"/>
-              </a:ext>
-              <a:ext uri="{96DAC541-7B7A-43D3-8B79-37D633B846F1}">
-                <asvg:svgBlip xmlns:asvg="http://schemas.microsoft.com/office/drawing/2016/SVG/main" r:embed="rId6"/>
-              </a:ext>
-            </a:extLst>
-          </a:blip>
-          <a:stretch>
-            <a:fillRect/>
-          </a:stretch>
-        </p:blipFill>
-        <p:spPr>
-          <a:xfrm>
-            <a:off x="2143125" y="2847974"/>
-            <a:ext cx="405721" cy="405721"/>
-          </a:xfrm>
-          <a:prstGeom prst="rect">
-            <a:avLst/>
-          </a:prstGeom>
-        </p:spPr>
-      </p:pic>
-      <p:pic>
-        <p:nvPicPr>
-          <p:cNvPr id="14" name="Graphic 13" descr="Checkmark">
-            <a:extLst>
-              <a:ext uri="{FF2B5EF4-FFF2-40B4-BE49-F238E27FC236}">
-                <a16:creationId xmlns:a16="http://schemas.microsoft.com/office/drawing/2014/main" id="{71C60629-5DDF-4A87-A71E-D0709BCCC666}"/>
-              </a:ext>
-            </a:extLst>
-          </p:cNvPr>
-          <p:cNvPicPr>
-            <a:picLocks noChangeAspect="1"/>
-          </p:cNvPicPr>
-          <p:nvPr/>
-        </p:nvPicPr>
-        <p:blipFill>
-          <a:blip r:embed="rId5">
-            <a:extLst>
-              <a:ext uri="{28A0092B-C50C-407E-A947-70E740481C1C}">
-                <a14:useLocalDpi xmlns:a14="http://schemas.microsoft.com/office/drawing/2010/main"/>
-              </a:ext>
-              <a:ext uri="{96DAC541-7B7A-43D3-8B79-37D633B846F1}">
-                <asvg:svgBlip xmlns:asvg="http://schemas.microsoft.com/office/drawing/2016/SVG/main" r:embed="rId7"/>
-              </a:ext>
-            </a:extLst>
-          </a:blip>
-          <a:stretch>
-            <a:fillRect/>
-          </a:stretch>
-        </p:blipFill>
-        <p:spPr>
-          <a:xfrm>
-            <a:off x="2143125" y="3213780"/>
-            <a:ext cx="405721" cy="405721"/>
-          </a:xfrm>
-          <a:prstGeom prst="rect">
-            <a:avLst/>
-          </a:prstGeom>
-        </p:spPr>
-      </p:pic>
-      <p:pic>
-        <p:nvPicPr>
-          <p:cNvPr id="15" name="Graphic 14" descr="Checkmark">
-            <a:extLst>
-              <a:ext uri="{FF2B5EF4-FFF2-40B4-BE49-F238E27FC236}">
-                <a16:creationId xmlns:a16="http://schemas.microsoft.com/office/drawing/2014/main" id="{DBFAC348-6866-4BB0-B4FB-D22947DA6FD5}"/>
-              </a:ext>
-            </a:extLst>
-          </p:cNvPr>
-          <p:cNvPicPr>
-            <a:picLocks noChangeAspect="1"/>
-          </p:cNvPicPr>
-          <p:nvPr/>
-        </p:nvPicPr>
-        <p:blipFill>
-          <a:blip r:embed="rId5">
-            <a:extLst>
-              <a:ext uri="{28A0092B-C50C-407E-A947-70E740481C1C}">
-                <a14:useLocalDpi xmlns:a14="http://schemas.microsoft.com/office/drawing/2010/main"/>
-              </a:ext>
-              <a:ext uri="{96DAC541-7B7A-43D3-8B79-37D633B846F1}">
-                <asvg:svgBlip xmlns:asvg="http://schemas.microsoft.com/office/drawing/2016/SVG/main" r:embed="rId7"/>
-              </a:ext>
-            </a:extLst>
-          </a:blip>
-          <a:stretch>
-            <a:fillRect/>
-          </a:stretch>
-        </p:blipFill>
-        <p:spPr>
-          <a:xfrm>
-            <a:off x="2139271" y="3589655"/>
-            <a:ext cx="405721" cy="405721"/>
-          </a:xfrm>
-          <a:prstGeom prst="rect">
-            <a:avLst/>
-          </a:prstGeom>
-        </p:spPr>
-      </p:pic>
-      <p:graphicFrame>
-        <p:nvGraphicFramePr>
-          <p:cNvPr id="3" name="Table 2">
-            <a:extLst>
-              <a:ext uri="{FF2B5EF4-FFF2-40B4-BE49-F238E27FC236}">
-                <a16:creationId xmlns:a16="http://schemas.microsoft.com/office/drawing/2014/main" id="{FB3E1B07-34A0-4ACF-AC1C-45B25E4D6CE9}"/>
-              </a:ext>
-            </a:extLst>
-          </p:cNvPr>
-          <p:cNvGraphicFramePr>
-            <a:graphicFrameLocks noGrp="1"/>
-          </p:cNvGraphicFramePr>
-          <p:nvPr>
-            <p:extLst>
-              <p:ext uri="{D42A27DB-BD31-4B8C-83A1-F6EECF244321}">
-                <p14:modId xmlns:p14="http://schemas.microsoft.com/office/powerpoint/2010/main" val="777599055"/>
+                <p14:modId xmlns:p14="http://schemas.microsoft.com/office/powerpoint/2010/main" val="746748072"/>
               </p:ext>
             </p:extLst>
           </p:nvPr>
@@ -4702,14 +3955,14 @@
                 <a:gridCol w="4064000">
                   <a:extLst>
                     <a:ext uri="{9D8B030D-6E8A-4147-A177-3AD203B41FA5}">
-                      <a16:colId xmlns:a16="http://schemas.microsoft.com/office/drawing/2014/main" val="3075661065"/>
+                      <a16:colId xmlns:a16="http://schemas.microsoft.com/office/drawing/2014/main" val="455180586"/>
                     </a:ext>
                   </a:extLst>
                 </a:gridCol>
                 <a:gridCol w="4064000">
                   <a:extLst>
                     <a:ext uri="{9D8B030D-6E8A-4147-A177-3AD203B41FA5}">
-                      <a16:colId xmlns:a16="http://schemas.microsoft.com/office/drawing/2014/main" val="2992441762"/>
+                      <a16:colId xmlns:a16="http://schemas.microsoft.com/office/drawing/2014/main" val="4132905458"/>
                     </a:ext>
                   </a:extLst>
                 </a:gridCol>
@@ -4743,7 +3996,7 @@
                 </a:tc>
                 <a:extLst>
                   <a:ext uri="{0D108BD9-81ED-4DB2-BD59-A6C34878D82A}">
-                    <a16:rowId xmlns:a16="http://schemas.microsoft.com/office/drawing/2014/main" val="3292732180"/>
+                    <a16:rowId xmlns:a16="http://schemas.microsoft.com/office/drawing/2014/main" val="4262069997"/>
                   </a:ext>
                 </a:extLst>
               </a:tr>
@@ -4776,7 +4029,7 @@
                 </a:tc>
                 <a:extLst>
                   <a:ext uri="{0D108BD9-81ED-4DB2-BD59-A6C34878D82A}">
-                    <a16:rowId xmlns:a16="http://schemas.microsoft.com/office/drawing/2014/main" val="3933621223"/>
+                    <a16:rowId xmlns:a16="http://schemas.microsoft.com/office/drawing/2014/main" val="2548333306"/>
                   </a:ext>
                 </a:extLst>
               </a:tr>
@@ -4809,7 +4062,7 @@
                 </a:tc>
                 <a:extLst>
                   <a:ext uri="{0D108BD9-81ED-4DB2-BD59-A6C34878D82A}">
-                    <a16:rowId xmlns:a16="http://schemas.microsoft.com/office/drawing/2014/main" val="199399901"/>
+                    <a16:rowId xmlns:a16="http://schemas.microsoft.com/office/drawing/2014/main" val="261747566"/>
                   </a:ext>
                 </a:extLst>
               </a:tr>
@@ -4817,6 +4070,43 @@
           </a:graphicData>
         </a:graphic>
       </p:graphicFrame>
+      <p:sp>
+        <p:nvSpPr>
+          <p:cNvPr id="6" name="TextBox 5">
+            <a:extLst>
+              <a:ext uri="{FF2B5EF4-FFF2-40B4-BE49-F238E27FC236}">
+                <a16:creationId xmlns:a16="http://schemas.microsoft.com/office/drawing/2014/main" id="{63CF1A6C-6FDE-4AD9-AC3B-F37F72D26B19}"/>
+              </a:ext>
+            </a:extLst>
+          </p:cNvPr>
+          <p:cNvSpPr txBox="1"/>
+          <p:nvPr/>
+        </p:nvSpPr>
+        <p:spPr>
+          <a:xfrm>
+            <a:off x="381000" y="381000"/>
+            <a:ext cx="4318000" cy="954107"/>
+          </a:xfrm>
+          <a:prstGeom prst="rect">
+            <a:avLst/>
+          </a:prstGeom>
+          <a:noFill/>
+        </p:spPr>
+        <p:txBody>
+          <a:bodyPr vert="horz" rtlCol="0">
+            <a:spAutoFit/>
+          </a:bodyPr>
+          <a:lstStyle/>
+          <a:p>
+            <a:r>
+              <a:rPr lang="en-US" sz="2800">
+                <a:latin typeface="Calibri" panose="020F0502020204030204" pitchFamily="34" charset="0"/>
+              </a:rPr>
+              <a:t>Accomplishments for Week of 04/09/20 - 04/16/20</a:t>
+            </a:r>
+          </a:p>
+        </p:txBody>
+      </p:sp>
     </p:spTree>
     <p:extLst>
       <p:ext uri="{BB962C8B-B14F-4D97-AF65-F5344CB8AC3E}">
@@ -5009,413 +4299,12 @@
           </a:prstGeom>
         </p:spPr>
       </p:pic>
-      <p:sp>
-        <p:nvSpPr>
-          <p:cNvPr id="10" name="Content Placeholder 2">
-            <a:extLst>
-              <a:ext uri="{FF2B5EF4-FFF2-40B4-BE49-F238E27FC236}">
-                <a16:creationId xmlns:a16="http://schemas.microsoft.com/office/drawing/2014/main" id="{B3ECB315-E679-4C67-AF9B-9CBE29479D0A}"/>
-              </a:ext>
-            </a:extLst>
-          </p:cNvPr>
-          <p:cNvSpPr txBox="1">
-            <a:spLocks/>
-          </p:cNvSpPr>
-          <p:nvPr/>
-        </p:nvSpPr>
-        <p:spPr>
-          <a:xfrm>
-            <a:off x="838200" y="1386638"/>
-            <a:ext cx="3076575" cy="651712"/>
-          </a:xfrm>
-          <a:prstGeom prst="rect">
-            <a:avLst/>
-          </a:prstGeom>
-        </p:spPr>
-        <p:txBody>
-          <a:bodyPr vert="horz" lIns="91440" tIns="45720" rIns="91440" bIns="45720" rtlCol="0">
-            <a:normAutofit/>
-          </a:bodyPr>
-          <a:lstStyle>
-            <a:lvl1pPr marL="228600" indent="-228600" algn="l" defTabSz="914400" rtl="0" eaLnBrk="1" latinLnBrk="0" hangingPunct="1">
-              <a:lnSpc>
-                <a:spcPct val="90000"/>
-              </a:lnSpc>
-              <a:spcBef>
-                <a:spcPts val="1000"/>
-              </a:spcBef>
-              <a:buFont typeface="Arial" panose="020B0604020202020204" pitchFamily="34" charset="0"/>
-              <a:buChar char="•"/>
-              <a:defRPr sz="2800" kern="1200">
-                <a:solidFill>
-                  <a:schemeClr val="tx1"/>
-                </a:solidFill>
-                <a:latin typeface="+mn-lt"/>
-                <a:ea typeface="+mn-ea"/>
-                <a:cs typeface="+mn-cs"/>
-              </a:defRPr>
-            </a:lvl1pPr>
-            <a:lvl2pPr marL="685800" indent="-228600" algn="l" defTabSz="914400" rtl="0" eaLnBrk="1" latinLnBrk="0" hangingPunct="1">
-              <a:lnSpc>
-                <a:spcPct val="90000"/>
-              </a:lnSpc>
-              <a:spcBef>
-                <a:spcPts val="500"/>
-              </a:spcBef>
-              <a:buFont typeface="Arial" panose="020B0604020202020204" pitchFamily="34" charset="0"/>
-              <a:buChar char="•"/>
-              <a:defRPr sz="2400" kern="1200">
-                <a:solidFill>
-                  <a:schemeClr val="tx1"/>
-                </a:solidFill>
-                <a:latin typeface="+mn-lt"/>
-                <a:ea typeface="+mn-ea"/>
-                <a:cs typeface="+mn-cs"/>
-              </a:defRPr>
-            </a:lvl2pPr>
-            <a:lvl3pPr marL="1143000" indent="-228600" algn="l" defTabSz="914400" rtl="0" eaLnBrk="1" latinLnBrk="0" hangingPunct="1">
-              <a:lnSpc>
-                <a:spcPct val="90000"/>
-              </a:lnSpc>
-              <a:spcBef>
-                <a:spcPts val="500"/>
-              </a:spcBef>
-              <a:buFont typeface="Arial" panose="020B0604020202020204" pitchFamily="34" charset="0"/>
-              <a:buChar char="•"/>
-              <a:defRPr sz="2000" kern="1200">
-                <a:solidFill>
-                  <a:schemeClr val="tx1"/>
-                </a:solidFill>
-                <a:latin typeface="+mn-lt"/>
-                <a:ea typeface="+mn-ea"/>
-                <a:cs typeface="+mn-cs"/>
-              </a:defRPr>
-            </a:lvl3pPr>
-            <a:lvl4pPr marL="1600200" indent="-228600" algn="l" defTabSz="914400" rtl="0" eaLnBrk="1" latinLnBrk="0" hangingPunct="1">
-              <a:lnSpc>
-                <a:spcPct val="90000"/>
-              </a:lnSpc>
-              <a:spcBef>
-                <a:spcPts val="500"/>
-              </a:spcBef>
-              <a:buFont typeface="Arial" panose="020B0604020202020204" pitchFamily="34" charset="0"/>
-              <a:buChar char="•"/>
-              <a:defRPr sz="1800" kern="1200">
-                <a:solidFill>
-                  <a:schemeClr val="tx1"/>
-                </a:solidFill>
-                <a:latin typeface="+mn-lt"/>
-                <a:ea typeface="+mn-ea"/>
-                <a:cs typeface="+mn-cs"/>
-              </a:defRPr>
-            </a:lvl4pPr>
-            <a:lvl5pPr marL="2057400" indent="-228600" algn="l" defTabSz="914400" rtl="0" eaLnBrk="1" latinLnBrk="0" hangingPunct="1">
-              <a:lnSpc>
-                <a:spcPct val="90000"/>
-              </a:lnSpc>
-              <a:spcBef>
-                <a:spcPts val="500"/>
-              </a:spcBef>
-              <a:buFont typeface="Arial" panose="020B0604020202020204" pitchFamily="34" charset="0"/>
-              <a:buChar char="•"/>
-              <a:defRPr sz="1800" kern="1200">
-                <a:solidFill>
-                  <a:schemeClr val="tx1"/>
-                </a:solidFill>
-                <a:latin typeface="+mn-lt"/>
-                <a:ea typeface="+mn-ea"/>
-                <a:cs typeface="+mn-cs"/>
-              </a:defRPr>
-            </a:lvl5pPr>
-            <a:lvl6pPr marL="2514600" indent="-228600" algn="l" defTabSz="914400" rtl="0" eaLnBrk="1" latinLnBrk="0" hangingPunct="1">
-              <a:lnSpc>
-                <a:spcPct val="90000"/>
-              </a:lnSpc>
-              <a:spcBef>
-                <a:spcPts val="500"/>
-              </a:spcBef>
-              <a:buFont typeface="Arial" panose="020B0604020202020204" pitchFamily="34" charset="0"/>
-              <a:buChar char="•"/>
-              <a:defRPr sz="1800" kern="1200">
-                <a:solidFill>
-                  <a:schemeClr val="tx1"/>
-                </a:solidFill>
-                <a:latin typeface="+mn-lt"/>
-                <a:ea typeface="+mn-ea"/>
-                <a:cs typeface="+mn-cs"/>
-              </a:defRPr>
-            </a:lvl6pPr>
-            <a:lvl7pPr marL="2971800" indent="-228600" algn="l" defTabSz="914400" rtl="0" eaLnBrk="1" latinLnBrk="0" hangingPunct="1">
-              <a:lnSpc>
-                <a:spcPct val="90000"/>
-              </a:lnSpc>
-              <a:spcBef>
-                <a:spcPts val="500"/>
-              </a:spcBef>
-              <a:buFont typeface="Arial" panose="020B0604020202020204" pitchFamily="34" charset="0"/>
-              <a:buChar char="•"/>
-              <a:defRPr sz="1800" kern="1200">
-                <a:solidFill>
-                  <a:schemeClr val="tx1"/>
-                </a:solidFill>
-                <a:latin typeface="+mn-lt"/>
-                <a:ea typeface="+mn-ea"/>
-                <a:cs typeface="+mn-cs"/>
-              </a:defRPr>
-            </a:lvl7pPr>
-            <a:lvl8pPr marL="3429000" indent="-228600" algn="l" defTabSz="914400" rtl="0" eaLnBrk="1" latinLnBrk="0" hangingPunct="1">
-              <a:lnSpc>
-                <a:spcPct val="90000"/>
-              </a:lnSpc>
-              <a:spcBef>
-                <a:spcPts val="500"/>
-              </a:spcBef>
-              <a:buFont typeface="Arial" panose="020B0604020202020204" pitchFamily="34" charset="0"/>
-              <a:buChar char="•"/>
-              <a:defRPr sz="1800" kern="1200">
-                <a:solidFill>
-                  <a:schemeClr val="tx1"/>
-                </a:solidFill>
-                <a:latin typeface="+mn-lt"/>
-                <a:ea typeface="+mn-ea"/>
-                <a:cs typeface="+mn-cs"/>
-              </a:defRPr>
-            </a:lvl8pPr>
-            <a:lvl9pPr marL="3886200" indent="-228600" algn="l" defTabSz="914400" rtl="0" eaLnBrk="1" latinLnBrk="0" hangingPunct="1">
-              <a:lnSpc>
-                <a:spcPct val="90000"/>
-              </a:lnSpc>
-              <a:spcBef>
-                <a:spcPts val="500"/>
-              </a:spcBef>
-              <a:buFont typeface="Arial" panose="020B0604020202020204" pitchFamily="34" charset="0"/>
-              <a:buChar char="•"/>
-              <a:defRPr sz="1800" kern="1200">
-                <a:solidFill>
-                  <a:schemeClr val="tx1"/>
-                </a:solidFill>
-                <a:latin typeface="+mn-lt"/>
-                <a:ea typeface="+mn-ea"/>
-                <a:cs typeface="+mn-cs"/>
-              </a:defRPr>
-            </a:lvl9pPr>
-          </a:lstStyle>
-          <a:p>
-            <a:r>
-              <a:rPr lang="en-US" dirty="0"/>
-              <a:t>Risk Register as of </a:t>
-            </a:r>
-          </a:p>
-        </p:txBody>
-      </p:sp>
-      <p:sp>
-        <p:nvSpPr>
-          <p:cNvPr id="11" name="Content Placeholder 2">
-            <a:extLst>
-              <a:ext uri="{FF2B5EF4-FFF2-40B4-BE49-F238E27FC236}">
-                <a16:creationId xmlns:a16="http://schemas.microsoft.com/office/drawing/2014/main" id="{45186F2B-543E-44F9-9F78-F9E2F915AD92}"/>
-              </a:ext>
-            </a:extLst>
-          </p:cNvPr>
-          <p:cNvSpPr txBox="1">
-            <a:spLocks/>
-          </p:cNvSpPr>
-          <p:nvPr/>
-        </p:nvSpPr>
-        <p:spPr>
-          <a:xfrm>
-            <a:off x="3829050" y="1386638"/>
-            <a:ext cx="4838700" cy="651712"/>
-          </a:xfrm>
-          <a:prstGeom prst="rect">
-            <a:avLst/>
-          </a:prstGeom>
-        </p:spPr>
-        <p:txBody>
-          <a:bodyPr vert="horz" lIns="91440" tIns="45720" rIns="91440" bIns="45720" rtlCol="0">
-            <a:normAutofit/>
-          </a:bodyPr>
-          <a:lstStyle>
-            <a:lvl1pPr marL="228600" indent="-228600" algn="l" defTabSz="914400" rtl="0" eaLnBrk="1" latinLnBrk="0" hangingPunct="1">
-              <a:lnSpc>
-                <a:spcPct val="90000"/>
-              </a:lnSpc>
-              <a:spcBef>
-                <a:spcPts val="1000"/>
-              </a:spcBef>
-              <a:buFont typeface="Arial" panose="020B0604020202020204" pitchFamily="34" charset="0"/>
-              <a:buChar char="•"/>
-              <a:defRPr sz="2800" kern="1200">
-                <a:solidFill>
-                  <a:schemeClr val="tx1"/>
-                </a:solidFill>
-                <a:latin typeface="+mn-lt"/>
-                <a:ea typeface="+mn-ea"/>
-                <a:cs typeface="+mn-cs"/>
-              </a:defRPr>
-            </a:lvl1pPr>
-            <a:lvl2pPr marL="685800" indent="-228600" algn="l" defTabSz="914400" rtl="0" eaLnBrk="1" latinLnBrk="0" hangingPunct="1">
-              <a:lnSpc>
-                <a:spcPct val="90000"/>
-              </a:lnSpc>
-              <a:spcBef>
-                <a:spcPts val="500"/>
-              </a:spcBef>
-              <a:buFont typeface="Arial" panose="020B0604020202020204" pitchFamily="34" charset="0"/>
-              <a:buChar char="•"/>
-              <a:defRPr sz="2400" kern="1200">
-                <a:solidFill>
-                  <a:schemeClr val="tx1"/>
-                </a:solidFill>
-                <a:latin typeface="+mn-lt"/>
-                <a:ea typeface="+mn-ea"/>
-                <a:cs typeface="+mn-cs"/>
-              </a:defRPr>
-            </a:lvl2pPr>
-            <a:lvl3pPr marL="1143000" indent="-228600" algn="l" defTabSz="914400" rtl="0" eaLnBrk="1" latinLnBrk="0" hangingPunct="1">
-              <a:lnSpc>
-                <a:spcPct val="90000"/>
-              </a:lnSpc>
-              <a:spcBef>
-                <a:spcPts val="500"/>
-              </a:spcBef>
-              <a:buFont typeface="Arial" panose="020B0604020202020204" pitchFamily="34" charset="0"/>
-              <a:buChar char="•"/>
-              <a:defRPr sz="2000" kern="1200">
-                <a:solidFill>
-                  <a:schemeClr val="tx1"/>
-                </a:solidFill>
-                <a:latin typeface="+mn-lt"/>
-                <a:ea typeface="+mn-ea"/>
-                <a:cs typeface="+mn-cs"/>
-              </a:defRPr>
-            </a:lvl3pPr>
-            <a:lvl4pPr marL="1600200" indent="-228600" algn="l" defTabSz="914400" rtl="0" eaLnBrk="1" latinLnBrk="0" hangingPunct="1">
-              <a:lnSpc>
-                <a:spcPct val="90000"/>
-              </a:lnSpc>
-              <a:spcBef>
-                <a:spcPts val="500"/>
-              </a:spcBef>
-              <a:buFont typeface="Arial" panose="020B0604020202020204" pitchFamily="34" charset="0"/>
-              <a:buChar char="•"/>
-              <a:defRPr sz="1800" kern="1200">
-                <a:solidFill>
-                  <a:schemeClr val="tx1"/>
-                </a:solidFill>
-                <a:latin typeface="+mn-lt"/>
-                <a:ea typeface="+mn-ea"/>
-                <a:cs typeface="+mn-cs"/>
-              </a:defRPr>
-            </a:lvl4pPr>
-            <a:lvl5pPr marL="2057400" indent="-228600" algn="l" defTabSz="914400" rtl="0" eaLnBrk="1" latinLnBrk="0" hangingPunct="1">
-              <a:lnSpc>
-                <a:spcPct val="90000"/>
-              </a:lnSpc>
-              <a:spcBef>
-                <a:spcPts val="500"/>
-              </a:spcBef>
-              <a:buFont typeface="Arial" panose="020B0604020202020204" pitchFamily="34" charset="0"/>
-              <a:buChar char="•"/>
-              <a:defRPr sz="1800" kern="1200">
-                <a:solidFill>
-                  <a:schemeClr val="tx1"/>
-                </a:solidFill>
-                <a:latin typeface="+mn-lt"/>
-                <a:ea typeface="+mn-ea"/>
-                <a:cs typeface="+mn-cs"/>
-              </a:defRPr>
-            </a:lvl5pPr>
-            <a:lvl6pPr marL="2514600" indent="-228600" algn="l" defTabSz="914400" rtl="0" eaLnBrk="1" latinLnBrk="0" hangingPunct="1">
-              <a:lnSpc>
-                <a:spcPct val="90000"/>
-              </a:lnSpc>
-              <a:spcBef>
-                <a:spcPts val="500"/>
-              </a:spcBef>
-              <a:buFont typeface="Arial" panose="020B0604020202020204" pitchFamily="34" charset="0"/>
-              <a:buChar char="•"/>
-              <a:defRPr sz="1800" kern="1200">
-                <a:solidFill>
-                  <a:schemeClr val="tx1"/>
-                </a:solidFill>
-                <a:latin typeface="+mn-lt"/>
-                <a:ea typeface="+mn-ea"/>
-                <a:cs typeface="+mn-cs"/>
-              </a:defRPr>
-            </a:lvl6pPr>
-            <a:lvl7pPr marL="2971800" indent="-228600" algn="l" defTabSz="914400" rtl="0" eaLnBrk="1" latinLnBrk="0" hangingPunct="1">
-              <a:lnSpc>
-                <a:spcPct val="90000"/>
-              </a:lnSpc>
-              <a:spcBef>
-                <a:spcPts val="500"/>
-              </a:spcBef>
-              <a:buFont typeface="Arial" panose="020B0604020202020204" pitchFamily="34" charset="0"/>
-              <a:buChar char="•"/>
-              <a:defRPr sz="1800" kern="1200">
-                <a:solidFill>
-                  <a:schemeClr val="tx1"/>
-                </a:solidFill>
-                <a:latin typeface="+mn-lt"/>
-                <a:ea typeface="+mn-ea"/>
-                <a:cs typeface="+mn-cs"/>
-              </a:defRPr>
-            </a:lvl7pPr>
-            <a:lvl8pPr marL="3429000" indent="-228600" algn="l" defTabSz="914400" rtl="0" eaLnBrk="1" latinLnBrk="0" hangingPunct="1">
-              <a:lnSpc>
-                <a:spcPct val="90000"/>
-              </a:lnSpc>
-              <a:spcBef>
-                <a:spcPts val="500"/>
-              </a:spcBef>
-              <a:buFont typeface="Arial" panose="020B0604020202020204" pitchFamily="34" charset="0"/>
-              <a:buChar char="•"/>
-              <a:defRPr sz="1800" kern="1200">
-                <a:solidFill>
-                  <a:schemeClr val="tx1"/>
-                </a:solidFill>
-                <a:latin typeface="+mn-lt"/>
-                <a:ea typeface="+mn-ea"/>
-                <a:cs typeface="+mn-cs"/>
-              </a:defRPr>
-            </a:lvl8pPr>
-            <a:lvl9pPr marL="3886200" indent="-228600" algn="l" defTabSz="914400" rtl="0" eaLnBrk="1" latinLnBrk="0" hangingPunct="1">
-              <a:lnSpc>
-                <a:spcPct val="90000"/>
-              </a:lnSpc>
-              <a:spcBef>
-                <a:spcPts val="500"/>
-              </a:spcBef>
-              <a:buFont typeface="Arial" panose="020B0604020202020204" pitchFamily="34" charset="0"/>
-              <a:buChar char="•"/>
-              <a:defRPr sz="1800" kern="1200">
-                <a:solidFill>
-                  <a:schemeClr val="tx1"/>
-                </a:solidFill>
-                <a:latin typeface="+mn-lt"/>
-                <a:ea typeface="+mn-ea"/>
-                <a:cs typeface="+mn-cs"/>
-              </a:defRPr>
-            </a:lvl9pPr>
-          </a:lstStyle>
-          <a:p>
-            <a:pPr marL="0" indent="0">
-              <a:buNone/>
-            </a:pPr>
-            <a:r>
-              <a:rPr lang="en-US" dirty="0"/>
-              <a:t>04/15/2020</a:t>
-            </a:r>
-          </a:p>
-        </p:txBody>
-      </p:sp>
       <p:graphicFrame>
         <p:nvGraphicFramePr>
-          <p:cNvPr id="12" name="10">
-            <a:extLst>
-              <a:ext uri="{FF2B5EF4-FFF2-40B4-BE49-F238E27FC236}">
-                <a16:creationId xmlns:a16="http://schemas.microsoft.com/office/drawing/2014/main" id="{895332B6-5C45-4DC9-B482-92D0E52B4CF2}"/>
+          <p:cNvPr id="2" name="Table 1">
+            <a:extLst>
+              <a:ext uri="{FF2B5EF4-FFF2-40B4-BE49-F238E27FC236}">
+                <a16:creationId xmlns:a16="http://schemas.microsoft.com/office/drawing/2014/main" id="{73D32276-1FAC-4761-8F29-B39E8BEC628A}"/>
               </a:ext>
             </a:extLst>
           </p:cNvPr>
@@ -5425,248 +4314,7 @@
           <p:nvPr>
             <p:extLst>
               <p:ext uri="{D42A27DB-BD31-4B8C-83A1-F6EECF244321}">
-                <p14:modId xmlns:p14="http://schemas.microsoft.com/office/powerpoint/2010/main" val="773025837"/>
-              </p:ext>
-            </p:extLst>
-          </p:nvPr>
-        </p:nvGraphicFramePr>
-        <p:xfrm>
-          <a:off x="838199" y="2275277"/>
-          <a:ext cx="10432473" cy="1752600"/>
-        </p:xfrm>
-        <a:graphic>
-          <a:graphicData uri="http://schemas.openxmlformats.org/drawingml/2006/table">
-            <a:tbl>
-              <a:tblPr firstRow="1" bandRow="1">
-                <a:tableStyleId>{B301B821-A1FF-4177-AEE7-76D212191A09}</a:tableStyleId>
-              </a:tblPr>
-              <a:tblGrid>
-                <a:gridCol w="6619876">
-                  <a:extLst>
-                    <a:ext uri="{9D8B030D-6E8A-4147-A177-3AD203B41FA5}">
-                      <a16:colId xmlns:a16="http://schemas.microsoft.com/office/drawing/2014/main" val="3857336290"/>
-                    </a:ext>
-                  </a:extLst>
-                </a:gridCol>
-                <a:gridCol w="1838325">
-                  <a:extLst>
-                    <a:ext uri="{9D8B030D-6E8A-4147-A177-3AD203B41FA5}">
-                      <a16:colId xmlns:a16="http://schemas.microsoft.com/office/drawing/2014/main" val="3521509764"/>
-                    </a:ext>
-                  </a:extLst>
-                </a:gridCol>
-                <a:gridCol w="1974272">
-                  <a:extLst>
-                    <a:ext uri="{9D8B030D-6E8A-4147-A177-3AD203B41FA5}">
-                      <a16:colId xmlns:a16="http://schemas.microsoft.com/office/drawing/2014/main" val="1257671124"/>
-                    </a:ext>
-                  </a:extLst>
-                </a:gridCol>
-              </a:tblGrid>
-              <a:tr h="370840">
-                <a:tc>
-                  <a:txBody>
-                    <a:bodyPr/>
-                    <a:lstStyle/>
-                    <a:p>
-                      <a:r>
-                        <a:rPr lang="en-US" dirty="0"/>
-                        <a:t>Risk</a:t>
-                      </a:r>
-                    </a:p>
-                  </a:txBody>
-                  <a:tcPr/>
-                </a:tc>
-                <a:tc>
-                  <a:txBody>
-                    <a:bodyPr/>
-                    <a:lstStyle/>
-                    <a:p>
-                      <a:r>
-                        <a:rPr lang="en-US" dirty="0"/>
-                        <a:t>Severity</a:t>
-                      </a:r>
-                    </a:p>
-                  </a:txBody>
-                  <a:tcPr/>
-                </a:tc>
-                <a:tc>
-                  <a:txBody>
-                    <a:bodyPr/>
-                    <a:lstStyle/>
-                    <a:p>
-                      <a:r>
-                        <a:rPr lang="en-US" dirty="0"/>
-                        <a:t>Owner</a:t>
-                      </a:r>
-                    </a:p>
-                  </a:txBody>
-                  <a:tcPr/>
-                </a:tc>
-                <a:extLst>
-                  <a:ext uri="{0D108BD9-81ED-4DB2-BD59-A6C34878D82A}">
-                    <a16:rowId xmlns:a16="http://schemas.microsoft.com/office/drawing/2014/main" val="5578277"/>
-                  </a:ext>
-                </a:extLst>
-              </a:tr>
-              <a:tr h="370840">
-                <a:tc>
-                  <a:txBody>
-                    <a:bodyPr/>
-                    <a:lstStyle/>
-                    <a:p>
-                      <a:r>
-                        <a:rPr lang="en-US" dirty="0"/>
-                        <a:t>If the bot is too awesome, then Skynet will be built</a:t>
-                      </a:r>
-                    </a:p>
-                  </a:txBody>
-                  <a:tcPr/>
-                </a:tc>
-                <a:tc>
-                  <a:txBody>
-                    <a:bodyPr/>
-                    <a:lstStyle/>
-                    <a:p>
-                      <a:r>
-                        <a:rPr lang="en-US" dirty="0"/>
-                        <a:t>Medium</a:t>
-                      </a:r>
-                    </a:p>
-                  </a:txBody>
-                  <a:tcPr/>
-                </a:tc>
-                <a:tc>
-                  <a:txBody>
-                    <a:bodyPr/>
-                    <a:lstStyle/>
-                    <a:p>
-                      <a:r>
-                        <a:rPr lang="en-US" dirty="0"/>
-                        <a:t>Elevate Bot</a:t>
-                      </a:r>
-                    </a:p>
-                  </a:txBody>
-                  <a:tcPr/>
-                </a:tc>
-                <a:extLst>
-                  <a:ext uri="{0D108BD9-81ED-4DB2-BD59-A6C34878D82A}">
-                    <a16:rowId xmlns:a16="http://schemas.microsoft.com/office/drawing/2014/main" val="61454587"/>
-                  </a:ext>
-                </a:extLst>
-              </a:tr>
-              <a:tr h="370840">
-                <a:tc>
-                  <a:txBody>
-                    <a:bodyPr/>
-                    <a:lstStyle/>
-                    <a:p>
-                      <a:r>
-                        <a:rPr lang="en-US" dirty="0"/>
-                        <a:t>If the bot isn’t awesome enough, then you need VerticalApps to make it better</a:t>
-                      </a:r>
-                    </a:p>
-                  </a:txBody>
-                  <a:tcPr/>
-                </a:tc>
-                <a:tc>
-                  <a:txBody>
-                    <a:bodyPr/>
-                    <a:lstStyle/>
-                    <a:p>
-                      <a:r>
-                        <a:rPr lang="en-US" dirty="0"/>
-                        <a:t>Low</a:t>
-                      </a:r>
-                    </a:p>
-                  </a:txBody>
-                  <a:tcPr/>
-                </a:tc>
-                <a:tc>
-                  <a:txBody>
-                    <a:bodyPr/>
-                    <a:lstStyle/>
-                    <a:p>
-                      <a:r>
-                        <a:rPr lang="en-US" dirty="0"/>
-                        <a:t>Elevate Bot</a:t>
-                      </a:r>
-                    </a:p>
-                  </a:txBody>
-                  <a:tcPr/>
-                </a:tc>
-                <a:extLst>
-                  <a:ext uri="{0D108BD9-81ED-4DB2-BD59-A6C34878D82A}">
-                    <a16:rowId xmlns:a16="http://schemas.microsoft.com/office/drawing/2014/main" val="3189033733"/>
-                  </a:ext>
-                </a:extLst>
-              </a:tr>
-              <a:tr h="370840">
-                <a:tc>
-                  <a:txBody>
-                    <a:bodyPr/>
-                    <a:lstStyle/>
-                    <a:p>
-                      <a:r>
-                        <a:rPr lang="en-US" dirty="0"/>
-                        <a:t>This is another risk that needs to be added</a:t>
-                      </a:r>
-                    </a:p>
-                  </a:txBody>
-                  <a:tcPr/>
-                </a:tc>
-                <a:tc>
-                  <a:txBody>
-                    <a:bodyPr/>
-                    <a:lstStyle/>
-                    <a:p>
-                      <a:r>
-                        <a:rPr lang="en-US" dirty="0"/>
-                        <a:t>Low</a:t>
-                      </a:r>
-                    </a:p>
-                  </a:txBody>
-                  <a:tcPr/>
-                </a:tc>
-                <a:tc>
-                  <a:txBody>
-                    <a:bodyPr/>
-                    <a:lstStyle/>
-                    <a:p>
-                      <a:r>
-                        <a:rPr lang="en-US" dirty="0"/>
-                        <a:t>Elevate Bot</a:t>
-                      </a:r>
-                    </a:p>
-                  </a:txBody>
-                  <a:tcPr/>
-                </a:tc>
-                <a:extLst>
-                  <a:ext uri="{0D108BD9-81ED-4DB2-BD59-A6C34878D82A}">
-                    <a16:rowId xmlns:a16="http://schemas.microsoft.com/office/drawing/2014/main" val="381752107"/>
-                  </a:ext>
-                </a:extLst>
-              </a:tr>
-            </a:tbl>
-          </a:graphicData>
-        </a:graphic>
-      </p:graphicFrame>
-      <p:graphicFrame>
-        <p:nvGraphicFramePr>
-          <p:cNvPr id="2" name="Table 1">
-            <a:extLst>
-              <a:ext uri="{FF2B5EF4-FFF2-40B4-BE49-F238E27FC236}">
-                <a16:creationId xmlns:a16="http://schemas.microsoft.com/office/drawing/2014/main" id="{23A64537-1A60-4A73-8B65-467596E177A0}"/>
-              </a:ext>
-            </a:extLst>
-          </p:cNvPr>
-          <p:cNvGraphicFramePr>
-            <a:graphicFrameLocks noGrp="1"/>
-          </p:cNvGraphicFramePr>
-          <p:nvPr>
-            <p:extLst>
-              <p:ext uri="{D42A27DB-BD31-4B8C-83A1-F6EECF244321}">
-                <p14:modId xmlns:p14="http://schemas.microsoft.com/office/powerpoint/2010/main" val="746634734"/>
+                <p14:modId xmlns:p14="http://schemas.microsoft.com/office/powerpoint/2010/main" val="222078305"/>
               </p:ext>
             </p:extLst>
           </p:nvPr>
@@ -5685,21 +4333,21 @@
                 <a:gridCol w="2709333">
                   <a:extLst>
                     <a:ext uri="{9D8B030D-6E8A-4147-A177-3AD203B41FA5}">
-                      <a16:colId xmlns:a16="http://schemas.microsoft.com/office/drawing/2014/main" val="2186254044"/>
+                      <a16:colId xmlns:a16="http://schemas.microsoft.com/office/drawing/2014/main" val="330366147"/>
                     </a:ext>
                   </a:extLst>
                 </a:gridCol>
                 <a:gridCol w="2709333">
                   <a:extLst>
                     <a:ext uri="{9D8B030D-6E8A-4147-A177-3AD203B41FA5}">
-                      <a16:colId xmlns:a16="http://schemas.microsoft.com/office/drawing/2014/main" val="2852005123"/>
+                      <a16:colId xmlns:a16="http://schemas.microsoft.com/office/drawing/2014/main" val="4262169714"/>
                     </a:ext>
                   </a:extLst>
                 </a:gridCol>
                 <a:gridCol w="2709333">
                   <a:extLst>
                     <a:ext uri="{9D8B030D-6E8A-4147-A177-3AD203B41FA5}">
-                      <a16:colId xmlns:a16="http://schemas.microsoft.com/office/drawing/2014/main" val="2076152527"/>
+                      <a16:colId xmlns:a16="http://schemas.microsoft.com/office/drawing/2014/main" val="4166216655"/>
                     </a:ext>
                   </a:extLst>
                 </a:gridCol>
@@ -5746,7 +4394,7 @@
                 </a:tc>
                 <a:extLst>
                   <a:ext uri="{0D108BD9-81ED-4DB2-BD59-A6C34878D82A}">
-                    <a16:rowId xmlns:a16="http://schemas.microsoft.com/office/drawing/2014/main" val="3808015986"/>
+                    <a16:rowId xmlns:a16="http://schemas.microsoft.com/office/drawing/2014/main" val="4234253927"/>
                   </a:ext>
                 </a:extLst>
               </a:tr>
@@ -5792,7 +4440,7 @@
                 </a:tc>
                 <a:extLst>
                   <a:ext uri="{0D108BD9-81ED-4DB2-BD59-A6C34878D82A}">
-                    <a16:rowId xmlns:a16="http://schemas.microsoft.com/office/drawing/2014/main" val="3625312855"/>
+                    <a16:rowId xmlns:a16="http://schemas.microsoft.com/office/drawing/2014/main" val="622791610"/>
                   </a:ext>
                 </a:extLst>
               </a:tr>
@@ -5838,7 +4486,7 @@
                 </a:tc>
                 <a:extLst>
                   <a:ext uri="{0D108BD9-81ED-4DB2-BD59-A6C34878D82A}">
-                    <a16:rowId xmlns:a16="http://schemas.microsoft.com/office/drawing/2014/main" val="2995708850"/>
+                    <a16:rowId xmlns:a16="http://schemas.microsoft.com/office/drawing/2014/main" val="1653438559"/>
                   </a:ext>
                 </a:extLst>
               </a:tr>
@@ -5846,396 +4494,43 @@
           </a:graphicData>
         </a:graphic>
       </p:graphicFrame>
-      <p:graphicFrame>
-        <p:nvGraphicFramePr>
-          <p:cNvPr id="3" name="Table 2">
-            <a:extLst>
-              <a:ext uri="{FF2B5EF4-FFF2-40B4-BE49-F238E27FC236}">
-                <a16:creationId xmlns:a16="http://schemas.microsoft.com/office/drawing/2014/main" id="{390421B4-BDA9-4B38-B6FB-004BDA42838A}"/>
-              </a:ext>
-            </a:extLst>
-          </p:cNvPr>
-          <p:cNvGraphicFramePr>
-            <a:graphicFrameLocks noGrp="1"/>
-          </p:cNvGraphicFramePr>
-          <p:nvPr>
-            <p:extLst>
-              <p:ext uri="{D42A27DB-BD31-4B8C-83A1-F6EECF244321}">
-                <p14:modId xmlns:p14="http://schemas.microsoft.com/office/powerpoint/2010/main" val="3552803943"/>
-              </p:ext>
-            </p:extLst>
-          </p:nvPr>
-        </p:nvGraphicFramePr>
-        <p:xfrm>
-          <a:off x="2032000" y="719666"/>
-          <a:ext cx="8128000" cy="5418667"/>
-        </p:xfrm>
-        <a:graphic>
-          <a:graphicData uri="http://schemas.openxmlformats.org/drawingml/2006/table">
-            <a:tbl>
-              <a:tblPr firstRow="1" bandRow="1">
-                <a:tableStyleId>{5C22544A-7EE6-4342-B048-85BDC9FD1C3A}</a:tableStyleId>
-              </a:tblPr>
-              <a:tblGrid>
-                <a:gridCol w="2709333">
-                  <a:extLst>
-                    <a:ext uri="{9D8B030D-6E8A-4147-A177-3AD203B41FA5}">
-                      <a16:colId xmlns:a16="http://schemas.microsoft.com/office/drawing/2014/main" val="54348564"/>
-                    </a:ext>
-                  </a:extLst>
-                </a:gridCol>
-                <a:gridCol w="2709333">
-                  <a:extLst>
-                    <a:ext uri="{9D8B030D-6E8A-4147-A177-3AD203B41FA5}">
-                      <a16:colId xmlns:a16="http://schemas.microsoft.com/office/drawing/2014/main" val="2614364924"/>
-                    </a:ext>
-                  </a:extLst>
-                </a:gridCol>
-                <a:gridCol w="2709333">
-                  <a:extLst>
-                    <a:ext uri="{9D8B030D-6E8A-4147-A177-3AD203B41FA5}">
-                      <a16:colId xmlns:a16="http://schemas.microsoft.com/office/drawing/2014/main" val="3772840628"/>
-                    </a:ext>
-                  </a:extLst>
-                </a:gridCol>
-              </a:tblGrid>
-              <a:tr h="370840">
-                <a:tc>
-                  <a:txBody>
-                    <a:bodyPr/>
-                    <a:lstStyle/>
-                    <a:p>
-                      <a:r>
-                        <a:rPr lang="en-US"/>
-                        <a:t>Risk Description</a:t>
-                      </a:r>
-                    </a:p>
-                  </a:txBody>
-                  <a:tcPr/>
-                </a:tc>
-                <a:tc>
-                  <a:txBody>
-                    <a:bodyPr/>
-                    <a:lstStyle/>
-                    <a:p>
-                      <a:r>
-                        <a:rPr lang="en-US"/>
-                        <a:t>Severity</a:t>
-                      </a:r>
-                    </a:p>
-                  </a:txBody>
-                  <a:tcPr/>
-                </a:tc>
-                <a:tc>
-                  <a:txBody>
-                    <a:bodyPr/>
-                    <a:lstStyle/>
-                    <a:p>
-                      <a:r>
-                        <a:rPr lang="en-US"/>
-                        <a:t>Owner</a:t>
-                      </a:r>
-                    </a:p>
-                  </a:txBody>
-                  <a:tcPr/>
-                </a:tc>
-                <a:extLst>
-                  <a:ext uri="{0D108BD9-81ED-4DB2-BD59-A6C34878D82A}">
-                    <a16:rowId xmlns:a16="http://schemas.microsoft.com/office/drawing/2014/main" val="1137461035"/>
-                  </a:ext>
-                </a:extLst>
-              </a:tr>
-              <a:tr h="370840">
-                <a:tc>
-                  <a:txBody>
-                    <a:bodyPr/>
-                    <a:lstStyle/>
-                    <a:p>
-                      <a:r>
-                        <a:rPr lang="en-US"/>
-                        <a:t>If something happens, then something bad will happen to the program</a:t>
-                      </a:r>
-                    </a:p>
-                  </a:txBody>
-                  <a:tcPr/>
-                </a:tc>
-                <a:tc>
-                  <a:txBody>
-                    <a:bodyPr/>
-                    <a:lstStyle/>
-                    <a:p>
-                      <a:r>
-                        <a:rPr lang="en-US"/>
-                        <a:t>High</a:t>
-                      </a:r>
-                    </a:p>
-                  </a:txBody>
-                  <a:tcPr/>
-                </a:tc>
-                <a:tc>
-                  <a:txBody>
-                    <a:bodyPr/>
-                    <a:lstStyle/>
-                    <a:p>
-                      <a:r>
-                        <a:rPr lang="en-US"/>
-                        <a:t>Elevate Bot</a:t>
-                      </a:r>
-                    </a:p>
-                  </a:txBody>
-                  <a:tcPr/>
-                </a:tc>
-                <a:extLst>
-                  <a:ext uri="{0D108BD9-81ED-4DB2-BD59-A6C34878D82A}">
-                    <a16:rowId xmlns:a16="http://schemas.microsoft.com/office/drawing/2014/main" val="177013359"/>
-                  </a:ext>
-                </a:extLst>
-              </a:tr>
-              <a:tr h="370840">
-                <a:tc>
-                  <a:txBody>
-                    <a:bodyPr/>
-                    <a:lstStyle/>
-                    <a:p>
-                      <a:r>
-                        <a:rPr lang="en-US"/>
-                        <a:t>If the bot gets a mind of its own, then we will need to kill it</a:t>
-                      </a:r>
-                    </a:p>
-                  </a:txBody>
-                  <a:tcPr/>
-                </a:tc>
-                <a:tc>
-                  <a:txBody>
-                    <a:bodyPr/>
-                    <a:lstStyle/>
-                    <a:p>
-                      <a:r>
-                        <a:rPr lang="en-US"/>
-                        <a:t>Medium</a:t>
-                      </a:r>
-                    </a:p>
-                  </a:txBody>
-                  <a:tcPr/>
-                </a:tc>
-                <a:tc>
-                  <a:txBody>
-                    <a:bodyPr/>
-                    <a:lstStyle/>
-                    <a:p>
-                      <a:r>
-                        <a:rPr lang="en-US"/>
-                        <a:t>Elevate Bot</a:t>
-                      </a:r>
-                    </a:p>
-                  </a:txBody>
-                  <a:tcPr/>
-                </a:tc>
-                <a:extLst>
-                  <a:ext uri="{0D108BD9-81ED-4DB2-BD59-A6C34878D82A}">
-                    <a16:rowId xmlns:a16="http://schemas.microsoft.com/office/drawing/2014/main" val="3226826857"/>
-                  </a:ext>
-                </a:extLst>
-              </a:tr>
-            </a:tbl>
-          </a:graphicData>
-        </a:graphic>
-      </p:graphicFrame>
-      <p:graphicFrame>
-        <p:nvGraphicFramePr>
-          <p:cNvPr id="8" name="Table 7">
-            <a:extLst>
-              <a:ext uri="{FF2B5EF4-FFF2-40B4-BE49-F238E27FC236}">
-                <a16:creationId xmlns:a16="http://schemas.microsoft.com/office/drawing/2014/main" id="{ED9D793B-D941-4690-9AB3-4BC858F2DBA8}"/>
-              </a:ext>
-            </a:extLst>
-          </p:cNvPr>
-          <p:cNvGraphicFramePr>
-            <a:graphicFrameLocks noGrp="1"/>
-          </p:cNvGraphicFramePr>
-          <p:nvPr>
-            <p:extLst>
-              <p:ext uri="{D42A27DB-BD31-4B8C-83A1-F6EECF244321}">
-                <p14:modId xmlns:p14="http://schemas.microsoft.com/office/powerpoint/2010/main" val="1518026304"/>
-              </p:ext>
-            </p:extLst>
-          </p:nvPr>
-        </p:nvGraphicFramePr>
-        <p:xfrm>
-          <a:off x="2032000" y="719666"/>
-          <a:ext cx="8128000" cy="5418667"/>
-        </p:xfrm>
-        <a:graphic>
-          <a:graphicData uri="http://schemas.openxmlformats.org/drawingml/2006/table">
-            <a:tbl>
-              <a:tblPr firstRow="1" bandRow="1">
-                <a:tableStyleId>{5C22544A-7EE6-4342-B048-85BDC9FD1C3A}</a:tableStyleId>
-              </a:tblPr>
-              <a:tblGrid>
-                <a:gridCol w="2709333">
-                  <a:extLst>
-                    <a:ext uri="{9D8B030D-6E8A-4147-A177-3AD203B41FA5}">
-                      <a16:colId xmlns:a16="http://schemas.microsoft.com/office/drawing/2014/main" val="1536174750"/>
-                    </a:ext>
-                  </a:extLst>
-                </a:gridCol>
-                <a:gridCol w="2709333">
-                  <a:extLst>
-                    <a:ext uri="{9D8B030D-6E8A-4147-A177-3AD203B41FA5}">
-                      <a16:colId xmlns:a16="http://schemas.microsoft.com/office/drawing/2014/main" val="2521029730"/>
-                    </a:ext>
-                  </a:extLst>
-                </a:gridCol>
-                <a:gridCol w="2709333">
-                  <a:extLst>
-                    <a:ext uri="{9D8B030D-6E8A-4147-A177-3AD203B41FA5}">
-                      <a16:colId xmlns:a16="http://schemas.microsoft.com/office/drawing/2014/main" val="165756356"/>
-                    </a:ext>
-                  </a:extLst>
-                </a:gridCol>
-              </a:tblGrid>
-              <a:tr h="370840">
-                <a:tc>
-                  <a:txBody>
-                    <a:bodyPr/>
-                    <a:lstStyle/>
-                    <a:p>
-                      <a:r>
-                        <a:rPr lang="en-US"/>
-                        <a:t>Risk Description</a:t>
-                      </a:r>
-                    </a:p>
-                  </a:txBody>
-                  <a:tcPr/>
-                </a:tc>
-                <a:tc>
-                  <a:txBody>
-                    <a:bodyPr/>
-                    <a:lstStyle/>
-                    <a:p>
-                      <a:r>
-                        <a:rPr lang="en-US"/>
-                        <a:t>Severity</a:t>
-                      </a:r>
-                    </a:p>
-                  </a:txBody>
-                  <a:tcPr/>
-                </a:tc>
-                <a:tc>
-                  <a:txBody>
-                    <a:bodyPr/>
-                    <a:lstStyle/>
-                    <a:p>
-                      <a:r>
-                        <a:rPr lang="en-US"/>
-                        <a:t>Owner</a:t>
-                      </a:r>
-                    </a:p>
-                  </a:txBody>
-                  <a:tcPr/>
-                </a:tc>
-                <a:extLst>
-                  <a:ext uri="{0D108BD9-81ED-4DB2-BD59-A6C34878D82A}">
-                    <a16:rowId xmlns:a16="http://schemas.microsoft.com/office/drawing/2014/main" val="1882771979"/>
-                  </a:ext>
-                </a:extLst>
-              </a:tr>
-              <a:tr h="370840">
-                <a:tc>
-                  <a:txBody>
-                    <a:bodyPr/>
-                    <a:lstStyle/>
-                    <a:p>
-                      <a:r>
-                        <a:rPr lang="en-US"/>
-                        <a:t>If something happens, then something bad will happen to the program</a:t>
-                      </a:r>
-                    </a:p>
-                  </a:txBody>
-                  <a:tcPr/>
-                </a:tc>
-                <a:tc>
-                  <a:txBody>
-                    <a:bodyPr/>
-                    <a:lstStyle/>
-                    <a:p>
-                      <a:r>
-                        <a:rPr lang="en-US"/>
-                        <a:t>High</a:t>
-                      </a:r>
-                    </a:p>
-                  </a:txBody>
-                  <a:tcPr/>
-                </a:tc>
-                <a:tc>
-                  <a:txBody>
-                    <a:bodyPr/>
-                    <a:lstStyle/>
-                    <a:p>
-                      <a:r>
-                        <a:rPr lang="en-US"/>
-                        <a:t>Elevate Bot</a:t>
-                      </a:r>
-                    </a:p>
-                  </a:txBody>
-                  <a:tcPr/>
-                </a:tc>
-                <a:extLst>
-                  <a:ext uri="{0D108BD9-81ED-4DB2-BD59-A6C34878D82A}">
-                    <a16:rowId xmlns:a16="http://schemas.microsoft.com/office/drawing/2014/main" val="3774382050"/>
-                  </a:ext>
-                </a:extLst>
-              </a:tr>
-              <a:tr h="370840">
-                <a:tc>
-                  <a:txBody>
-                    <a:bodyPr/>
-                    <a:lstStyle/>
-                    <a:p>
-                      <a:r>
-                        <a:rPr lang="en-US"/>
-                        <a:t>If the bot gets a mind of its own, then we will need to kill it</a:t>
-                      </a:r>
-                    </a:p>
-                  </a:txBody>
-                  <a:tcPr/>
-                </a:tc>
-                <a:tc>
-                  <a:txBody>
-                    <a:bodyPr/>
-                    <a:lstStyle/>
-                    <a:p>
-                      <a:r>
-                        <a:rPr lang="en-US"/>
-                        <a:t>Medium</a:t>
-                      </a:r>
-                    </a:p>
-                  </a:txBody>
-                  <a:tcPr/>
-                </a:tc>
-                <a:tc>
-                  <a:txBody>
-                    <a:bodyPr/>
-                    <a:lstStyle/>
-                    <a:p>
-                      <a:r>
-                        <a:rPr lang="en-US"/>
-                        <a:t>Elevate Bot</a:t>
-                      </a:r>
-                    </a:p>
-                  </a:txBody>
-                  <a:tcPr/>
-                </a:tc>
-                <a:extLst>
-                  <a:ext uri="{0D108BD9-81ED-4DB2-BD59-A6C34878D82A}">
-                    <a16:rowId xmlns:a16="http://schemas.microsoft.com/office/drawing/2014/main" val="674042823"/>
-                  </a:ext>
-                </a:extLst>
-              </a:tr>
-            </a:tbl>
-          </a:graphicData>
-        </a:graphic>
-      </p:graphicFrame>
+      <p:sp>
+        <p:nvSpPr>
+          <p:cNvPr id="3" name="TextBox 2">
+            <a:extLst>
+              <a:ext uri="{FF2B5EF4-FFF2-40B4-BE49-F238E27FC236}">
+                <a16:creationId xmlns:a16="http://schemas.microsoft.com/office/drawing/2014/main" id="{8454804D-6D67-4783-9989-2DA3BE0E6182}"/>
+              </a:ext>
+            </a:extLst>
+          </p:cNvPr>
+          <p:cNvSpPr txBox="1"/>
+          <p:nvPr/>
+        </p:nvSpPr>
+        <p:spPr>
+          <a:xfrm>
+            <a:off x="381000" y="381000"/>
+            <a:ext cx="4318000" cy="954107"/>
+          </a:xfrm>
+          <a:prstGeom prst="rect">
+            <a:avLst/>
+          </a:prstGeom>
+          <a:noFill/>
+        </p:spPr>
+        <p:txBody>
+          <a:bodyPr vert="horz" rtlCol="0">
+            <a:spAutoFit/>
+          </a:bodyPr>
+          <a:lstStyle/>
+          <a:p>
+            <a:r>
+              <a:rPr lang="en-US" sz="2800">
+                <a:latin typeface="Calibri" panose="020F0502020204030204" pitchFamily="34" charset="0"/>
+              </a:rPr>
+              <a:t>Risk Register as of  - 04/16/20</a:t>
+            </a:r>
+          </a:p>
+        </p:txBody>
+      </p:sp>
     </p:spTree>
     <p:extLst>
       <p:ext uri="{BB962C8B-B14F-4D97-AF65-F5344CB8AC3E}">

</xml_diff>